<commit_message>
ppt with final changes
</commit_message>
<xml_diff>
--- a/RobinHoodHashing_finstreet.pptx
+++ b/RobinHoodHashing_finstreet.pptx
@@ -4,12 +4,20 @@
   <p:sldMasterIdLst>
     <p:sldMasterId id="2147483648" r:id="rId1"/>
   </p:sldMasterIdLst>
+  <p:notesMasterIdLst>
+    <p:notesMasterId r:id="rId12"/>
+  </p:notesMasterIdLst>
   <p:sldIdLst>
     <p:sldId id="256" r:id="rId2"/>
-    <p:sldId id="260" r:id="rId3"/>
-    <p:sldId id="261" r:id="rId4"/>
-    <p:sldId id="259" r:id="rId5"/>
-    <p:sldId id="257" r:id="rId6"/>
+    <p:sldId id="262" r:id="rId3"/>
+    <p:sldId id="264" r:id="rId4"/>
+    <p:sldId id="261" r:id="rId5"/>
+    <p:sldId id="260" r:id="rId6"/>
+    <p:sldId id="265" r:id="rId7"/>
+    <p:sldId id="259" r:id="rId8"/>
+    <p:sldId id="263" r:id="rId9"/>
+    <p:sldId id="257" r:id="rId10"/>
+    <p:sldId id="266" r:id="rId11"/>
   </p:sldIdLst>
   <p:sldSz cx="12192000" cy="6858000"/>
   <p:notesSz cx="6858000" cy="9144000"/>
@@ -108,12 +116,549 @@
       </a:defRPr>
     </a:lvl9pPr>
   </p:defaultTextStyle>
-  <p:extLst>
-    <p:ext uri="{EFAFB233-063F-42B5-8137-9DF3F51BA10A}">
-      <p15:sldGuideLst xmlns:p15="http://schemas.microsoft.com/office/powerpoint/2012/main"/>
-    </p:ext>
-  </p:extLst>
 </p:presentation>
+</file>
+
+<file path=ppt/notesMasters/notesMaster1.xml><?xml version="1.0" encoding="utf-8"?>
+<p:notesMaster xmlns:a="http://schemas.openxmlformats.org/drawingml/2006/main" xmlns:r="http://schemas.openxmlformats.org/officeDocument/2006/relationships" xmlns:p="http://schemas.openxmlformats.org/presentationml/2006/main">
+  <p:cSld>
+    <p:bg>
+      <p:bgRef idx="1001">
+        <a:schemeClr val="bg1"/>
+      </p:bgRef>
+    </p:bg>
+    <p:spTree>
+      <p:nvGrpSpPr>
+        <p:cNvPr id="1" name=""/>
+        <p:cNvGrpSpPr/>
+        <p:nvPr/>
+      </p:nvGrpSpPr>
+      <p:grpSpPr>
+        <a:xfrm>
+          <a:off x="0" y="0"/>
+          <a:ext cx="0" cy="0"/>
+          <a:chOff x="0" y="0"/>
+          <a:chExt cx="0" cy="0"/>
+        </a:xfrm>
+      </p:grpSpPr>
+      <p:sp>
+        <p:nvSpPr>
+          <p:cNvPr id="2" name="Header Placeholder 1"/>
+          <p:cNvSpPr>
+            <a:spLocks noGrp="1"/>
+          </p:cNvSpPr>
+          <p:nvPr>
+            <p:ph type="hdr" sz="quarter"/>
+          </p:nvPr>
+        </p:nvSpPr>
+        <p:spPr>
+          <a:xfrm>
+            <a:off x="0" y="0"/>
+            <a:ext cx="2971800" cy="458788"/>
+          </a:xfrm>
+          <a:prstGeom prst="rect">
+            <a:avLst/>
+          </a:prstGeom>
+        </p:spPr>
+        <p:txBody>
+          <a:bodyPr vert="horz" lIns="91440" tIns="45720" rIns="91440" bIns="45720" rtlCol="0"/>
+          <a:lstStyle>
+            <a:lvl1pPr algn="l">
+              <a:defRPr sz="1200"/>
+            </a:lvl1pPr>
+          </a:lstStyle>
+          <a:p>
+            <a:endParaRPr lang="en-US"/>
+          </a:p>
+        </p:txBody>
+      </p:sp>
+      <p:sp>
+        <p:nvSpPr>
+          <p:cNvPr id="3" name="Date Placeholder 2"/>
+          <p:cNvSpPr>
+            <a:spLocks noGrp="1"/>
+          </p:cNvSpPr>
+          <p:nvPr>
+            <p:ph type="dt" idx="1"/>
+          </p:nvPr>
+        </p:nvSpPr>
+        <p:spPr>
+          <a:xfrm>
+            <a:off x="3884613" y="0"/>
+            <a:ext cx="2971800" cy="458788"/>
+          </a:xfrm>
+          <a:prstGeom prst="rect">
+            <a:avLst/>
+          </a:prstGeom>
+        </p:spPr>
+        <p:txBody>
+          <a:bodyPr vert="horz" lIns="91440" tIns="45720" rIns="91440" bIns="45720" rtlCol="0"/>
+          <a:lstStyle>
+            <a:lvl1pPr algn="r">
+              <a:defRPr sz="1200"/>
+            </a:lvl1pPr>
+          </a:lstStyle>
+          <a:p>
+            <a:fld id="{E4466720-85D0-C143-9D75-E1AE32D7134E}" type="datetimeFigureOut">
+              <a:rPr lang="en-US" smtClean="0"/>
+              <a:t>1/14/26</a:t>
+            </a:fld>
+            <a:endParaRPr lang="en-US"/>
+          </a:p>
+        </p:txBody>
+      </p:sp>
+      <p:sp>
+        <p:nvSpPr>
+          <p:cNvPr id="4" name="Slide Image Placeholder 3"/>
+          <p:cNvSpPr>
+            <a:spLocks noGrp="1" noRot="1" noChangeAspect="1"/>
+          </p:cNvSpPr>
+          <p:nvPr>
+            <p:ph type="sldImg" idx="2"/>
+          </p:nvPr>
+        </p:nvSpPr>
+        <p:spPr>
+          <a:xfrm>
+            <a:off x="685800" y="1143000"/>
+            <a:ext cx="5486400" cy="3086100"/>
+          </a:xfrm>
+          <a:prstGeom prst="rect">
+            <a:avLst/>
+          </a:prstGeom>
+          <a:noFill/>
+          <a:ln w="12700">
+            <a:solidFill>
+              <a:prstClr val="black"/>
+            </a:solidFill>
+          </a:ln>
+        </p:spPr>
+        <p:txBody>
+          <a:bodyPr vert="horz" lIns="91440" tIns="45720" rIns="91440" bIns="45720" rtlCol="0" anchor="ctr"/>
+          <a:lstStyle/>
+          <a:p>
+            <a:endParaRPr lang="en-US"/>
+          </a:p>
+        </p:txBody>
+      </p:sp>
+      <p:sp>
+        <p:nvSpPr>
+          <p:cNvPr id="5" name="Notes Placeholder 4"/>
+          <p:cNvSpPr>
+            <a:spLocks noGrp="1"/>
+          </p:cNvSpPr>
+          <p:nvPr>
+            <p:ph type="body" sz="quarter" idx="3"/>
+          </p:nvPr>
+        </p:nvSpPr>
+        <p:spPr>
+          <a:xfrm>
+            <a:off x="685800" y="4400550"/>
+            <a:ext cx="5486400" cy="3600450"/>
+          </a:xfrm>
+          <a:prstGeom prst="rect">
+            <a:avLst/>
+          </a:prstGeom>
+        </p:spPr>
+        <p:txBody>
+          <a:bodyPr vert="horz" lIns="91440" tIns="45720" rIns="91440" bIns="45720" rtlCol="0"/>
+          <a:lstStyle/>
+          <a:p>
+            <a:pPr lvl="0"/>
+            <a:r>
+              <a:rPr lang="en-GB"/>
+              <a:t>Click to edit Master text styles</a:t>
+            </a:r>
+          </a:p>
+          <a:p>
+            <a:pPr lvl="1"/>
+            <a:r>
+              <a:rPr lang="en-GB"/>
+              <a:t>Second level</a:t>
+            </a:r>
+          </a:p>
+          <a:p>
+            <a:pPr lvl="2"/>
+            <a:r>
+              <a:rPr lang="en-GB"/>
+              <a:t>Third level</a:t>
+            </a:r>
+          </a:p>
+          <a:p>
+            <a:pPr lvl="3"/>
+            <a:r>
+              <a:rPr lang="en-GB"/>
+              <a:t>Fourth level</a:t>
+            </a:r>
+          </a:p>
+          <a:p>
+            <a:pPr lvl="4"/>
+            <a:r>
+              <a:rPr lang="en-GB"/>
+              <a:t>Fifth level</a:t>
+            </a:r>
+            <a:endParaRPr lang="en-US"/>
+          </a:p>
+        </p:txBody>
+      </p:sp>
+      <p:sp>
+        <p:nvSpPr>
+          <p:cNvPr id="6" name="Footer Placeholder 5"/>
+          <p:cNvSpPr>
+            <a:spLocks noGrp="1"/>
+          </p:cNvSpPr>
+          <p:nvPr>
+            <p:ph type="ftr" sz="quarter" idx="4"/>
+          </p:nvPr>
+        </p:nvSpPr>
+        <p:spPr>
+          <a:xfrm>
+            <a:off x="0" y="8685213"/>
+            <a:ext cx="2971800" cy="458787"/>
+          </a:xfrm>
+          <a:prstGeom prst="rect">
+            <a:avLst/>
+          </a:prstGeom>
+        </p:spPr>
+        <p:txBody>
+          <a:bodyPr vert="horz" lIns="91440" tIns="45720" rIns="91440" bIns="45720" rtlCol="0" anchor="b"/>
+          <a:lstStyle>
+            <a:lvl1pPr algn="l">
+              <a:defRPr sz="1200"/>
+            </a:lvl1pPr>
+          </a:lstStyle>
+          <a:p>
+            <a:endParaRPr lang="en-US"/>
+          </a:p>
+        </p:txBody>
+      </p:sp>
+      <p:sp>
+        <p:nvSpPr>
+          <p:cNvPr id="7" name="Slide Number Placeholder 6"/>
+          <p:cNvSpPr>
+            <a:spLocks noGrp="1"/>
+          </p:cNvSpPr>
+          <p:nvPr>
+            <p:ph type="sldNum" sz="quarter" idx="5"/>
+          </p:nvPr>
+        </p:nvSpPr>
+        <p:spPr>
+          <a:xfrm>
+            <a:off x="3884613" y="8685213"/>
+            <a:ext cx="2971800" cy="458787"/>
+          </a:xfrm>
+          <a:prstGeom prst="rect">
+            <a:avLst/>
+          </a:prstGeom>
+        </p:spPr>
+        <p:txBody>
+          <a:bodyPr vert="horz" lIns="91440" tIns="45720" rIns="91440" bIns="45720" rtlCol="0" anchor="b"/>
+          <a:lstStyle>
+            <a:lvl1pPr algn="r">
+              <a:defRPr sz="1200"/>
+            </a:lvl1pPr>
+          </a:lstStyle>
+          <a:p>
+            <a:fld id="{11DBADB3-C335-DB46-B447-175306ABC4C5}" type="slidenum">
+              <a:rPr lang="en-US" smtClean="0"/>
+              <a:t>‹#›</a:t>
+            </a:fld>
+            <a:endParaRPr lang="en-US"/>
+          </a:p>
+        </p:txBody>
+      </p:sp>
+    </p:spTree>
+    <p:extLst>
+      <p:ext uri="{BB962C8B-B14F-4D97-AF65-F5344CB8AC3E}">
+        <p14:creationId xmlns:p14="http://schemas.microsoft.com/office/powerpoint/2010/main" val="977725781"/>
+      </p:ext>
+    </p:extLst>
+  </p:cSld>
+  <p:clrMap bg1="lt1" tx1="dk1" bg2="lt2" tx2="dk2" accent1="accent1" accent2="accent2" accent3="accent3" accent4="accent4" accent5="accent5" accent6="accent6" hlink="hlink" folHlink="folHlink"/>
+  <p:notesStyle>
+    <a:lvl1pPr marL="0" algn="l" defTabSz="914400" rtl="0" eaLnBrk="1" latinLnBrk="0" hangingPunct="1">
+      <a:defRPr sz="1200" kern="1200">
+        <a:solidFill>
+          <a:schemeClr val="tx1"/>
+        </a:solidFill>
+        <a:latin typeface="+mn-lt"/>
+        <a:ea typeface="+mn-ea"/>
+        <a:cs typeface="+mn-cs"/>
+      </a:defRPr>
+    </a:lvl1pPr>
+    <a:lvl2pPr marL="457200" algn="l" defTabSz="914400" rtl="0" eaLnBrk="1" latinLnBrk="0" hangingPunct="1">
+      <a:defRPr sz="1200" kern="1200">
+        <a:solidFill>
+          <a:schemeClr val="tx1"/>
+        </a:solidFill>
+        <a:latin typeface="+mn-lt"/>
+        <a:ea typeface="+mn-ea"/>
+        <a:cs typeface="+mn-cs"/>
+      </a:defRPr>
+    </a:lvl2pPr>
+    <a:lvl3pPr marL="914400" algn="l" defTabSz="914400" rtl="0" eaLnBrk="1" latinLnBrk="0" hangingPunct="1">
+      <a:defRPr sz="1200" kern="1200">
+        <a:solidFill>
+          <a:schemeClr val="tx1"/>
+        </a:solidFill>
+        <a:latin typeface="+mn-lt"/>
+        <a:ea typeface="+mn-ea"/>
+        <a:cs typeface="+mn-cs"/>
+      </a:defRPr>
+    </a:lvl3pPr>
+    <a:lvl4pPr marL="1371600" algn="l" defTabSz="914400" rtl="0" eaLnBrk="1" latinLnBrk="0" hangingPunct="1">
+      <a:defRPr sz="1200" kern="1200">
+        <a:solidFill>
+          <a:schemeClr val="tx1"/>
+        </a:solidFill>
+        <a:latin typeface="+mn-lt"/>
+        <a:ea typeface="+mn-ea"/>
+        <a:cs typeface="+mn-cs"/>
+      </a:defRPr>
+    </a:lvl4pPr>
+    <a:lvl5pPr marL="1828800" algn="l" defTabSz="914400" rtl="0" eaLnBrk="1" latinLnBrk="0" hangingPunct="1">
+      <a:defRPr sz="1200" kern="1200">
+        <a:solidFill>
+          <a:schemeClr val="tx1"/>
+        </a:solidFill>
+        <a:latin typeface="+mn-lt"/>
+        <a:ea typeface="+mn-ea"/>
+        <a:cs typeface="+mn-cs"/>
+      </a:defRPr>
+    </a:lvl5pPr>
+    <a:lvl6pPr marL="2286000" algn="l" defTabSz="914400" rtl="0" eaLnBrk="1" latinLnBrk="0" hangingPunct="1">
+      <a:defRPr sz="1200" kern="1200">
+        <a:solidFill>
+          <a:schemeClr val="tx1"/>
+        </a:solidFill>
+        <a:latin typeface="+mn-lt"/>
+        <a:ea typeface="+mn-ea"/>
+        <a:cs typeface="+mn-cs"/>
+      </a:defRPr>
+    </a:lvl6pPr>
+    <a:lvl7pPr marL="2743200" algn="l" defTabSz="914400" rtl="0" eaLnBrk="1" latinLnBrk="0" hangingPunct="1">
+      <a:defRPr sz="1200" kern="1200">
+        <a:solidFill>
+          <a:schemeClr val="tx1"/>
+        </a:solidFill>
+        <a:latin typeface="+mn-lt"/>
+        <a:ea typeface="+mn-ea"/>
+        <a:cs typeface="+mn-cs"/>
+      </a:defRPr>
+    </a:lvl7pPr>
+    <a:lvl8pPr marL="3200400" algn="l" defTabSz="914400" rtl="0" eaLnBrk="1" latinLnBrk="0" hangingPunct="1">
+      <a:defRPr sz="1200" kern="1200">
+        <a:solidFill>
+          <a:schemeClr val="tx1"/>
+        </a:solidFill>
+        <a:latin typeface="+mn-lt"/>
+        <a:ea typeface="+mn-ea"/>
+        <a:cs typeface="+mn-cs"/>
+      </a:defRPr>
+    </a:lvl8pPr>
+    <a:lvl9pPr marL="3657600" algn="l" defTabSz="914400" rtl="0" eaLnBrk="1" latinLnBrk="0" hangingPunct="1">
+      <a:defRPr sz="1200" kern="1200">
+        <a:solidFill>
+          <a:schemeClr val="tx1"/>
+        </a:solidFill>
+        <a:latin typeface="+mn-lt"/>
+        <a:ea typeface="+mn-ea"/>
+        <a:cs typeface="+mn-cs"/>
+      </a:defRPr>
+    </a:lvl9pPr>
+  </p:notesStyle>
+</p:notesMaster>
+</file>
+
+<file path=ppt/notesSlides/notesSlide1.xml><?xml version="1.0" encoding="utf-8"?>
+<p:notes xmlns:a="http://schemas.openxmlformats.org/drawingml/2006/main" xmlns:r="http://schemas.openxmlformats.org/officeDocument/2006/relationships" xmlns:p="http://schemas.openxmlformats.org/presentationml/2006/main">
+  <p:cSld>
+    <p:spTree>
+      <p:nvGrpSpPr>
+        <p:cNvPr id="1" name=""/>
+        <p:cNvGrpSpPr/>
+        <p:nvPr/>
+      </p:nvGrpSpPr>
+      <p:grpSpPr>
+        <a:xfrm>
+          <a:off x="0" y="0"/>
+          <a:ext cx="0" cy="0"/>
+          <a:chOff x="0" y="0"/>
+          <a:chExt cx="0" cy="0"/>
+        </a:xfrm>
+      </p:grpSpPr>
+      <p:sp>
+        <p:nvSpPr>
+          <p:cNvPr id="2" name="Slide Image Placeholder 1"/>
+          <p:cNvSpPr>
+            <a:spLocks noGrp="1" noRot="1" noChangeAspect="1"/>
+          </p:cNvSpPr>
+          <p:nvPr>
+            <p:ph type="sldImg"/>
+          </p:nvPr>
+        </p:nvSpPr>
+        <p:spPr/>
+      </p:sp>
+      <p:sp>
+        <p:nvSpPr>
+          <p:cNvPr id="3" name="Notes Placeholder 2"/>
+          <p:cNvSpPr>
+            <a:spLocks noGrp="1"/>
+          </p:cNvSpPr>
+          <p:nvPr>
+            <p:ph type="body" idx="1"/>
+          </p:nvPr>
+        </p:nvSpPr>
+        <p:spPr/>
+        <p:txBody>
+          <a:bodyPr/>
+          <a:lstStyle/>
+          <a:p>
+            <a:endParaRPr lang="en-US" dirty="0"/>
+          </a:p>
+        </p:txBody>
+      </p:sp>
+      <p:sp>
+        <p:nvSpPr>
+          <p:cNvPr id="4" name="Slide Number Placeholder 3"/>
+          <p:cNvSpPr>
+            <a:spLocks noGrp="1"/>
+          </p:cNvSpPr>
+          <p:nvPr>
+            <p:ph type="sldNum" sz="quarter" idx="5"/>
+          </p:nvPr>
+        </p:nvSpPr>
+        <p:spPr/>
+        <p:txBody>
+          <a:bodyPr/>
+          <a:lstStyle/>
+          <a:p>
+            <a:fld id="{11DBADB3-C335-DB46-B447-175306ABC4C5}" type="slidenum">
+              <a:rPr lang="en-US" smtClean="0"/>
+              <a:t>7</a:t>
+            </a:fld>
+            <a:endParaRPr lang="en-US"/>
+          </a:p>
+        </p:txBody>
+      </p:sp>
+    </p:spTree>
+    <p:extLst>
+      <p:ext uri="{BB962C8B-B14F-4D97-AF65-F5344CB8AC3E}">
+        <p14:creationId xmlns:p14="http://schemas.microsoft.com/office/powerpoint/2010/main" val="50842617"/>
+      </p:ext>
+    </p:extLst>
+  </p:cSld>
+  <p:clrMapOvr>
+    <a:masterClrMapping/>
+  </p:clrMapOvr>
+</p:notes>
+</file>
+
+<file path=ppt/notesSlides/notesSlide2.xml><?xml version="1.0" encoding="utf-8"?>
+<p:notes xmlns:a="http://schemas.openxmlformats.org/drawingml/2006/main" xmlns:r="http://schemas.openxmlformats.org/officeDocument/2006/relationships" xmlns:p="http://schemas.openxmlformats.org/presentationml/2006/main">
+  <p:cSld>
+    <p:spTree>
+      <p:nvGrpSpPr>
+        <p:cNvPr id="1" name="">
+          <a:extLst>
+            <a:ext uri="{FF2B5EF4-FFF2-40B4-BE49-F238E27FC236}">
+              <a16:creationId xmlns:a16="http://schemas.microsoft.com/office/drawing/2014/main" id="{4F5F93B4-2D5C-96C8-0330-5C827F725D26}"/>
+            </a:ext>
+          </a:extLst>
+        </p:cNvPr>
+        <p:cNvGrpSpPr/>
+        <p:nvPr/>
+      </p:nvGrpSpPr>
+      <p:grpSpPr>
+        <a:xfrm>
+          <a:off x="0" y="0"/>
+          <a:ext cx="0" cy="0"/>
+          <a:chOff x="0" y="0"/>
+          <a:chExt cx="0" cy="0"/>
+        </a:xfrm>
+      </p:grpSpPr>
+      <p:sp>
+        <p:nvSpPr>
+          <p:cNvPr id="2" name="Slide Image Placeholder 1">
+            <a:extLst>
+              <a:ext uri="{FF2B5EF4-FFF2-40B4-BE49-F238E27FC236}">
+                <a16:creationId xmlns:a16="http://schemas.microsoft.com/office/drawing/2014/main" id="{D71C1A69-4D5D-9C26-C018-FC3774F7842D}"/>
+              </a:ext>
+            </a:extLst>
+          </p:cNvPr>
+          <p:cNvSpPr>
+            <a:spLocks noGrp="1" noRot="1" noChangeAspect="1"/>
+          </p:cNvSpPr>
+          <p:nvPr>
+            <p:ph type="sldImg"/>
+          </p:nvPr>
+        </p:nvSpPr>
+        <p:spPr/>
+      </p:sp>
+      <p:sp>
+        <p:nvSpPr>
+          <p:cNvPr id="3" name="Notes Placeholder 2">
+            <a:extLst>
+              <a:ext uri="{FF2B5EF4-FFF2-40B4-BE49-F238E27FC236}">
+                <a16:creationId xmlns:a16="http://schemas.microsoft.com/office/drawing/2014/main" id="{7CE4E7DA-07BD-4F81-6916-A217F2A381F6}"/>
+              </a:ext>
+            </a:extLst>
+          </p:cNvPr>
+          <p:cNvSpPr>
+            <a:spLocks noGrp="1"/>
+          </p:cNvSpPr>
+          <p:nvPr>
+            <p:ph type="body" idx="1"/>
+          </p:nvPr>
+        </p:nvSpPr>
+        <p:spPr/>
+        <p:txBody>
+          <a:bodyPr/>
+          <a:lstStyle/>
+          <a:p>
+            <a:endParaRPr lang="en-US" dirty="0"/>
+          </a:p>
+        </p:txBody>
+      </p:sp>
+      <p:sp>
+        <p:nvSpPr>
+          <p:cNvPr id="4" name="Slide Number Placeholder 3">
+            <a:extLst>
+              <a:ext uri="{FF2B5EF4-FFF2-40B4-BE49-F238E27FC236}">
+                <a16:creationId xmlns:a16="http://schemas.microsoft.com/office/drawing/2014/main" id="{067AA0FA-ACEA-12A6-A8E8-7797F562F1F6}"/>
+              </a:ext>
+            </a:extLst>
+          </p:cNvPr>
+          <p:cNvSpPr>
+            <a:spLocks noGrp="1"/>
+          </p:cNvSpPr>
+          <p:nvPr>
+            <p:ph type="sldNum" sz="quarter" idx="5"/>
+          </p:nvPr>
+        </p:nvSpPr>
+        <p:spPr/>
+        <p:txBody>
+          <a:bodyPr/>
+          <a:lstStyle/>
+          <a:p>
+            <a:fld id="{11DBADB3-C335-DB46-B447-175306ABC4C5}" type="slidenum">
+              <a:rPr lang="en-US" smtClean="0"/>
+              <a:t>8</a:t>
+            </a:fld>
+            <a:endParaRPr lang="en-US"/>
+          </a:p>
+        </p:txBody>
+      </p:sp>
+    </p:spTree>
+    <p:extLst>
+      <p:ext uri="{BB962C8B-B14F-4D97-AF65-F5344CB8AC3E}">
+        <p14:creationId xmlns:p14="http://schemas.microsoft.com/office/powerpoint/2010/main" val="2145172595"/>
+      </p:ext>
+    </p:extLst>
+  </p:cSld>
+  <p:clrMapOvr>
+    <a:masterClrMapping/>
+  </p:clrMapOvr>
+</p:notes>
 </file>
 
 <file path=ppt/slideLayouts/slideLayout1.xml><?xml version="1.0" encoding="utf-8"?>
@@ -138,7 +683,7 @@
           <p:cNvPr id="2" name="Title 1">
             <a:extLst>
               <a:ext uri="{FF2B5EF4-FFF2-40B4-BE49-F238E27FC236}">
-                <a16:creationId xmlns:a16="http://schemas.microsoft.com/office/drawing/2014/main" id="{83C2E098-96B1-4F6E-7675-134F4665054C}"/>
+                <a16:creationId xmlns:a16="http://schemas.microsoft.com/office/drawing/2014/main" id="{F55F6567-3730-92F6-60AD-94D9F5BBC85A}"/>
               </a:ext>
             </a:extLst>
           </p:cNvPr>
@@ -176,7 +721,7 @@
           <p:cNvPr id="3" name="Subtitle 2">
             <a:extLst>
               <a:ext uri="{FF2B5EF4-FFF2-40B4-BE49-F238E27FC236}">
-                <a16:creationId xmlns:a16="http://schemas.microsoft.com/office/drawing/2014/main" id="{94DA2CBB-1C4B-7F3C-6150-43661F61C3ED}"/>
+                <a16:creationId xmlns:a16="http://schemas.microsoft.com/office/drawing/2014/main" id="{5C9C828B-1730-AB58-1B94-CACDA53415D5}"/>
               </a:ext>
             </a:extLst>
           </p:cNvPr>
@@ -247,7 +792,7 @@
           <p:cNvPr id="4" name="Date Placeholder 3">
             <a:extLst>
               <a:ext uri="{FF2B5EF4-FFF2-40B4-BE49-F238E27FC236}">
-                <a16:creationId xmlns:a16="http://schemas.microsoft.com/office/drawing/2014/main" id="{55F19F1C-591E-3CD9-71E2-175BBB7CC6EE}"/>
+                <a16:creationId xmlns:a16="http://schemas.microsoft.com/office/drawing/2014/main" id="{ED08F96C-C2B3-3C31-8C12-828F1D9E74F6}"/>
               </a:ext>
             </a:extLst>
           </p:cNvPr>
@@ -263,9 +808,9 @@
           <a:bodyPr/>
           <a:lstStyle/>
           <a:p>
-            <a:fld id="{A9B84BE5-C4F7-2347-BA74-2B6E17D1C756}" type="datetimeFigureOut">
+            <a:fld id="{6B84627A-7341-2945-9FBD-76ADD0571C52}" type="datetimeFigureOut">
               <a:rPr lang="en-US" smtClean="0"/>
-              <a:t>1/13/26</a:t>
+              <a:t>1/14/26</a:t>
             </a:fld>
             <a:endParaRPr lang="en-US"/>
           </a:p>
@@ -276,7 +821,7 @@
           <p:cNvPr id="5" name="Footer Placeholder 4">
             <a:extLst>
               <a:ext uri="{FF2B5EF4-FFF2-40B4-BE49-F238E27FC236}">
-                <a16:creationId xmlns:a16="http://schemas.microsoft.com/office/drawing/2014/main" id="{2E3E808B-018A-028D-C9E2-3159D0B13A3C}"/>
+                <a16:creationId xmlns:a16="http://schemas.microsoft.com/office/drawing/2014/main" id="{3A8A1E59-B538-C7F8-B3F3-0B8B4EA7AFFD}"/>
               </a:ext>
             </a:extLst>
           </p:cNvPr>
@@ -301,7 +846,7 @@
           <p:cNvPr id="6" name="Slide Number Placeholder 5">
             <a:extLst>
               <a:ext uri="{FF2B5EF4-FFF2-40B4-BE49-F238E27FC236}">
-                <a16:creationId xmlns:a16="http://schemas.microsoft.com/office/drawing/2014/main" id="{02CCF5A6-C608-4D00-EC6F-1E8EA8F9F13E}"/>
+                <a16:creationId xmlns:a16="http://schemas.microsoft.com/office/drawing/2014/main" id="{F20CAEEF-FA89-E782-2CE0-7B4254CCE631}"/>
               </a:ext>
             </a:extLst>
           </p:cNvPr>
@@ -317,7 +862,7 @@
           <a:bodyPr/>
           <a:lstStyle/>
           <a:p>
-            <a:fld id="{9DEE18FE-2860-EC4B-B6BB-21326898EEB6}" type="slidenum">
+            <a:fld id="{9FF3D289-ED7F-C541-B791-80E90E528BBE}" type="slidenum">
               <a:rPr lang="en-US" smtClean="0"/>
               <a:t>‹#›</a:t>
             </a:fld>
@@ -328,7 +873,7 @@
     </p:spTree>
     <p:extLst>
       <p:ext uri="{BB962C8B-B14F-4D97-AF65-F5344CB8AC3E}">
-        <p14:creationId xmlns:p14="http://schemas.microsoft.com/office/powerpoint/2010/main" val="2198534864"/>
+        <p14:creationId xmlns:p14="http://schemas.microsoft.com/office/powerpoint/2010/main" val="1294355307"/>
       </p:ext>
     </p:extLst>
   </p:cSld>
@@ -360,7 +905,7 @@
           <p:cNvPr id="2" name="Title 1">
             <a:extLst>
               <a:ext uri="{FF2B5EF4-FFF2-40B4-BE49-F238E27FC236}">
-                <a16:creationId xmlns:a16="http://schemas.microsoft.com/office/drawing/2014/main" id="{50E360FA-FA0C-0DA5-DB9F-C8F5772803F5}"/>
+                <a16:creationId xmlns:a16="http://schemas.microsoft.com/office/drawing/2014/main" id="{5FB6A879-FB93-B31A-FC5D-8C385F27302B}"/>
               </a:ext>
             </a:extLst>
           </p:cNvPr>
@@ -389,7 +934,7 @@
           <p:cNvPr id="3" name="Vertical Text Placeholder 2">
             <a:extLst>
               <a:ext uri="{FF2B5EF4-FFF2-40B4-BE49-F238E27FC236}">
-                <a16:creationId xmlns:a16="http://schemas.microsoft.com/office/drawing/2014/main" id="{623C1BB1-8A5C-5E06-AC27-F5B1B15CD932}"/>
+                <a16:creationId xmlns:a16="http://schemas.microsoft.com/office/drawing/2014/main" id="{DA946E63-B62E-8CB3-1094-1F60FA18EA93}"/>
               </a:ext>
             </a:extLst>
           </p:cNvPr>
@@ -447,7 +992,7 @@
           <p:cNvPr id="4" name="Date Placeholder 3">
             <a:extLst>
               <a:ext uri="{FF2B5EF4-FFF2-40B4-BE49-F238E27FC236}">
-                <a16:creationId xmlns:a16="http://schemas.microsoft.com/office/drawing/2014/main" id="{6D4CB2BA-7A21-16B6-F46E-0D35556E609D}"/>
+                <a16:creationId xmlns:a16="http://schemas.microsoft.com/office/drawing/2014/main" id="{5FF224E7-15FF-6BED-4B17-D29E501BB5EB}"/>
               </a:ext>
             </a:extLst>
           </p:cNvPr>
@@ -463,9 +1008,9 @@
           <a:bodyPr/>
           <a:lstStyle/>
           <a:p>
-            <a:fld id="{A9B84BE5-C4F7-2347-BA74-2B6E17D1C756}" type="datetimeFigureOut">
+            <a:fld id="{6B84627A-7341-2945-9FBD-76ADD0571C52}" type="datetimeFigureOut">
               <a:rPr lang="en-US" smtClean="0"/>
-              <a:t>1/13/26</a:t>
+              <a:t>1/14/26</a:t>
             </a:fld>
             <a:endParaRPr lang="en-US"/>
           </a:p>
@@ -476,7 +1021,7 @@
           <p:cNvPr id="5" name="Footer Placeholder 4">
             <a:extLst>
               <a:ext uri="{FF2B5EF4-FFF2-40B4-BE49-F238E27FC236}">
-                <a16:creationId xmlns:a16="http://schemas.microsoft.com/office/drawing/2014/main" id="{D69A2528-500F-A1CC-9515-71539EACE6D0}"/>
+                <a16:creationId xmlns:a16="http://schemas.microsoft.com/office/drawing/2014/main" id="{253DC7AD-4346-0C3A-8C5A-C7A8115E6414}"/>
               </a:ext>
             </a:extLst>
           </p:cNvPr>
@@ -501,7 +1046,7 @@
           <p:cNvPr id="6" name="Slide Number Placeholder 5">
             <a:extLst>
               <a:ext uri="{FF2B5EF4-FFF2-40B4-BE49-F238E27FC236}">
-                <a16:creationId xmlns:a16="http://schemas.microsoft.com/office/drawing/2014/main" id="{46A9C8FD-ED90-7F5C-C4B6-A2A006A31429}"/>
+                <a16:creationId xmlns:a16="http://schemas.microsoft.com/office/drawing/2014/main" id="{0419F862-09F6-2132-012D-15995D0095D8}"/>
               </a:ext>
             </a:extLst>
           </p:cNvPr>
@@ -517,7 +1062,7 @@
           <a:bodyPr/>
           <a:lstStyle/>
           <a:p>
-            <a:fld id="{9DEE18FE-2860-EC4B-B6BB-21326898EEB6}" type="slidenum">
+            <a:fld id="{9FF3D289-ED7F-C541-B791-80E90E528BBE}" type="slidenum">
               <a:rPr lang="en-US" smtClean="0"/>
               <a:t>‹#›</a:t>
             </a:fld>
@@ -528,7 +1073,7 @@
     </p:spTree>
     <p:extLst>
       <p:ext uri="{BB962C8B-B14F-4D97-AF65-F5344CB8AC3E}">
-        <p14:creationId xmlns:p14="http://schemas.microsoft.com/office/powerpoint/2010/main" val="1450430082"/>
+        <p14:creationId xmlns:p14="http://schemas.microsoft.com/office/powerpoint/2010/main" val="2362309912"/>
       </p:ext>
     </p:extLst>
   </p:cSld>
@@ -560,7 +1105,7 @@
           <p:cNvPr id="2" name="Vertical Title 1">
             <a:extLst>
               <a:ext uri="{FF2B5EF4-FFF2-40B4-BE49-F238E27FC236}">
-                <a16:creationId xmlns:a16="http://schemas.microsoft.com/office/drawing/2014/main" id="{06868575-9DEA-5D78-35BF-C264EAE3F266}"/>
+                <a16:creationId xmlns:a16="http://schemas.microsoft.com/office/drawing/2014/main" id="{E223C698-D4EC-783C-BB50-EE9D26F9AD54}"/>
               </a:ext>
             </a:extLst>
           </p:cNvPr>
@@ -594,7 +1139,7 @@
           <p:cNvPr id="3" name="Vertical Text Placeholder 2">
             <a:extLst>
               <a:ext uri="{FF2B5EF4-FFF2-40B4-BE49-F238E27FC236}">
-                <a16:creationId xmlns:a16="http://schemas.microsoft.com/office/drawing/2014/main" id="{1655283F-66EC-7EEA-C1C9-EB3686943912}"/>
+                <a16:creationId xmlns:a16="http://schemas.microsoft.com/office/drawing/2014/main" id="{1DA75E68-3370-5B23-0D76-76F0D37BB1E5}"/>
               </a:ext>
             </a:extLst>
           </p:cNvPr>
@@ -657,7 +1202,7 @@
           <p:cNvPr id="4" name="Date Placeholder 3">
             <a:extLst>
               <a:ext uri="{FF2B5EF4-FFF2-40B4-BE49-F238E27FC236}">
-                <a16:creationId xmlns:a16="http://schemas.microsoft.com/office/drawing/2014/main" id="{25430D0D-7584-969A-DE6C-BE247F4368B9}"/>
+                <a16:creationId xmlns:a16="http://schemas.microsoft.com/office/drawing/2014/main" id="{719403CD-7CE6-19CA-A21A-DB995C96920A}"/>
               </a:ext>
             </a:extLst>
           </p:cNvPr>
@@ -673,9 +1218,9 @@
           <a:bodyPr/>
           <a:lstStyle/>
           <a:p>
-            <a:fld id="{A9B84BE5-C4F7-2347-BA74-2B6E17D1C756}" type="datetimeFigureOut">
+            <a:fld id="{6B84627A-7341-2945-9FBD-76ADD0571C52}" type="datetimeFigureOut">
               <a:rPr lang="en-US" smtClean="0"/>
-              <a:t>1/13/26</a:t>
+              <a:t>1/14/26</a:t>
             </a:fld>
             <a:endParaRPr lang="en-US"/>
           </a:p>
@@ -686,7 +1231,7 @@
           <p:cNvPr id="5" name="Footer Placeholder 4">
             <a:extLst>
               <a:ext uri="{FF2B5EF4-FFF2-40B4-BE49-F238E27FC236}">
-                <a16:creationId xmlns:a16="http://schemas.microsoft.com/office/drawing/2014/main" id="{35473C2A-2F29-159F-DB32-498CBE92B797}"/>
+                <a16:creationId xmlns:a16="http://schemas.microsoft.com/office/drawing/2014/main" id="{17B72876-F73A-6DD6-F646-4C999681E723}"/>
               </a:ext>
             </a:extLst>
           </p:cNvPr>
@@ -711,7 +1256,7 @@
           <p:cNvPr id="6" name="Slide Number Placeholder 5">
             <a:extLst>
               <a:ext uri="{FF2B5EF4-FFF2-40B4-BE49-F238E27FC236}">
-                <a16:creationId xmlns:a16="http://schemas.microsoft.com/office/drawing/2014/main" id="{57CC1067-EBB9-8885-D5C3-E6EB68EAF5EB}"/>
+                <a16:creationId xmlns:a16="http://schemas.microsoft.com/office/drawing/2014/main" id="{BADBD551-3E2D-4BC7-91AF-5357CF4D500C}"/>
               </a:ext>
             </a:extLst>
           </p:cNvPr>
@@ -727,7 +1272,7 @@
           <a:bodyPr/>
           <a:lstStyle/>
           <a:p>
-            <a:fld id="{9DEE18FE-2860-EC4B-B6BB-21326898EEB6}" type="slidenum">
+            <a:fld id="{9FF3D289-ED7F-C541-B791-80E90E528BBE}" type="slidenum">
               <a:rPr lang="en-US" smtClean="0"/>
               <a:t>‹#›</a:t>
             </a:fld>
@@ -738,7 +1283,7 @@
     </p:spTree>
     <p:extLst>
       <p:ext uri="{BB962C8B-B14F-4D97-AF65-F5344CB8AC3E}">
-        <p14:creationId xmlns:p14="http://schemas.microsoft.com/office/powerpoint/2010/main" val="436194859"/>
+        <p14:creationId xmlns:p14="http://schemas.microsoft.com/office/powerpoint/2010/main" val="4038080015"/>
       </p:ext>
     </p:extLst>
   </p:cSld>
@@ -770,7 +1315,7 @@
           <p:cNvPr id="2" name="Title 1">
             <a:extLst>
               <a:ext uri="{FF2B5EF4-FFF2-40B4-BE49-F238E27FC236}">
-                <a16:creationId xmlns:a16="http://schemas.microsoft.com/office/drawing/2014/main" id="{788CFF69-8A68-6BFA-E507-EE859F89051B}"/>
+                <a16:creationId xmlns:a16="http://schemas.microsoft.com/office/drawing/2014/main" id="{7F8875C3-60DE-9145-3521-879D94BC1197}"/>
               </a:ext>
             </a:extLst>
           </p:cNvPr>
@@ -799,7 +1344,7 @@
           <p:cNvPr id="3" name="Content Placeholder 2">
             <a:extLst>
               <a:ext uri="{FF2B5EF4-FFF2-40B4-BE49-F238E27FC236}">
-                <a16:creationId xmlns:a16="http://schemas.microsoft.com/office/drawing/2014/main" id="{39685EAE-76F7-0E14-AAA9-445E46FBB042}"/>
+                <a16:creationId xmlns:a16="http://schemas.microsoft.com/office/drawing/2014/main" id="{0FE68FB7-25C5-34D3-9650-1E4A850DA365}"/>
               </a:ext>
             </a:extLst>
           </p:cNvPr>
@@ -857,7 +1402,7 @@
           <p:cNvPr id="4" name="Date Placeholder 3">
             <a:extLst>
               <a:ext uri="{FF2B5EF4-FFF2-40B4-BE49-F238E27FC236}">
-                <a16:creationId xmlns:a16="http://schemas.microsoft.com/office/drawing/2014/main" id="{16E70A84-816A-FFFE-F825-F2F188C9D358}"/>
+                <a16:creationId xmlns:a16="http://schemas.microsoft.com/office/drawing/2014/main" id="{7DD21482-39BA-B953-5A19-48157FA8D729}"/>
               </a:ext>
             </a:extLst>
           </p:cNvPr>
@@ -873,9 +1418,9 @@
           <a:bodyPr/>
           <a:lstStyle/>
           <a:p>
-            <a:fld id="{A9B84BE5-C4F7-2347-BA74-2B6E17D1C756}" type="datetimeFigureOut">
+            <a:fld id="{6B84627A-7341-2945-9FBD-76ADD0571C52}" type="datetimeFigureOut">
               <a:rPr lang="en-US" smtClean="0"/>
-              <a:t>1/13/26</a:t>
+              <a:t>1/14/26</a:t>
             </a:fld>
             <a:endParaRPr lang="en-US"/>
           </a:p>
@@ -886,7 +1431,7 @@
           <p:cNvPr id="5" name="Footer Placeholder 4">
             <a:extLst>
               <a:ext uri="{FF2B5EF4-FFF2-40B4-BE49-F238E27FC236}">
-                <a16:creationId xmlns:a16="http://schemas.microsoft.com/office/drawing/2014/main" id="{C76E764E-531D-FC2B-B664-AAFE064ACC6B}"/>
+                <a16:creationId xmlns:a16="http://schemas.microsoft.com/office/drawing/2014/main" id="{3E6E83D4-8417-2639-E43E-6C679BDEBB2B}"/>
               </a:ext>
             </a:extLst>
           </p:cNvPr>
@@ -911,7 +1456,7 @@
           <p:cNvPr id="6" name="Slide Number Placeholder 5">
             <a:extLst>
               <a:ext uri="{FF2B5EF4-FFF2-40B4-BE49-F238E27FC236}">
-                <a16:creationId xmlns:a16="http://schemas.microsoft.com/office/drawing/2014/main" id="{CF71E7FD-2038-750C-CB78-65351032D996}"/>
+                <a16:creationId xmlns:a16="http://schemas.microsoft.com/office/drawing/2014/main" id="{6B21F8E2-389C-9D78-19D6-B3511D9C52A2}"/>
               </a:ext>
             </a:extLst>
           </p:cNvPr>
@@ -927,7 +1472,7 @@
           <a:bodyPr/>
           <a:lstStyle/>
           <a:p>
-            <a:fld id="{9DEE18FE-2860-EC4B-B6BB-21326898EEB6}" type="slidenum">
+            <a:fld id="{9FF3D289-ED7F-C541-B791-80E90E528BBE}" type="slidenum">
               <a:rPr lang="en-US" smtClean="0"/>
               <a:t>‹#›</a:t>
             </a:fld>
@@ -938,7 +1483,7 @@
     </p:spTree>
     <p:extLst>
       <p:ext uri="{BB962C8B-B14F-4D97-AF65-F5344CB8AC3E}">
-        <p14:creationId xmlns:p14="http://schemas.microsoft.com/office/powerpoint/2010/main" val="970881720"/>
+        <p14:creationId xmlns:p14="http://schemas.microsoft.com/office/powerpoint/2010/main" val="2020042865"/>
       </p:ext>
     </p:extLst>
   </p:cSld>
@@ -970,7 +1515,7 @@
           <p:cNvPr id="2" name="Title 1">
             <a:extLst>
               <a:ext uri="{FF2B5EF4-FFF2-40B4-BE49-F238E27FC236}">
-                <a16:creationId xmlns:a16="http://schemas.microsoft.com/office/drawing/2014/main" id="{9F4558B2-25B0-FBDE-A2FA-6032AB4AF0C7}"/>
+                <a16:creationId xmlns:a16="http://schemas.microsoft.com/office/drawing/2014/main" id="{EFDEA150-B9D9-B7A7-6B50-F1F4B6B31217}"/>
               </a:ext>
             </a:extLst>
           </p:cNvPr>
@@ -1008,7 +1553,7 @@
           <p:cNvPr id="3" name="Text Placeholder 2">
             <a:extLst>
               <a:ext uri="{FF2B5EF4-FFF2-40B4-BE49-F238E27FC236}">
-                <a16:creationId xmlns:a16="http://schemas.microsoft.com/office/drawing/2014/main" id="{7017C8EF-E0F8-3AAC-1932-487EB7B6F3A5}"/>
+                <a16:creationId xmlns:a16="http://schemas.microsoft.com/office/drawing/2014/main" id="{145D75BF-2BE2-6A7E-340D-F1DCEEBE297B}"/>
               </a:ext>
             </a:extLst>
           </p:cNvPr>
@@ -1133,7 +1678,7 @@
           <p:cNvPr id="4" name="Date Placeholder 3">
             <a:extLst>
               <a:ext uri="{FF2B5EF4-FFF2-40B4-BE49-F238E27FC236}">
-                <a16:creationId xmlns:a16="http://schemas.microsoft.com/office/drawing/2014/main" id="{0F401502-C15E-9A70-F3FF-8DF3A89D4E23}"/>
+                <a16:creationId xmlns:a16="http://schemas.microsoft.com/office/drawing/2014/main" id="{A88C91AC-8CC9-8AE1-EF2F-151002A98AE6}"/>
               </a:ext>
             </a:extLst>
           </p:cNvPr>
@@ -1149,9 +1694,9 @@
           <a:bodyPr/>
           <a:lstStyle/>
           <a:p>
-            <a:fld id="{A9B84BE5-C4F7-2347-BA74-2B6E17D1C756}" type="datetimeFigureOut">
+            <a:fld id="{6B84627A-7341-2945-9FBD-76ADD0571C52}" type="datetimeFigureOut">
               <a:rPr lang="en-US" smtClean="0"/>
-              <a:t>1/13/26</a:t>
+              <a:t>1/14/26</a:t>
             </a:fld>
             <a:endParaRPr lang="en-US"/>
           </a:p>
@@ -1162,7 +1707,7 @@
           <p:cNvPr id="5" name="Footer Placeholder 4">
             <a:extLst>
               <a:ext uri="{FF2B5EF4-FFF2-40B4-BE49-F238E27FC236}">
-                <a16:creationId xmlns:a16="http://schemas.microsoft.com/office/drawing/2014/main" id="{9135BF01-97CC-8B4B-D4A4-07812BE5E517}"/>
+                <a16:creationId xmlns:a16="http://schemas.microsoft.com/office/drawing/2014/main" id="{6930B3E8-5497-D68A-624E-C6D868F30BE4}"/>
               </a:ext>
             </a:extLst>
           </p:cNvPr>
@@ -1187,7 +1732,7 @@
           <p:cNvPr id="6" name="Slide Number Placeholder 5">
             <a:extLst>
               <a:ext uri="{FF2B5EF4-FFF2-40B4-BE49-F238E27FC236}">
-                <a16:creationId xmlns:a16="http://schemas.microsoft.com/office/drawing/2014/main" id="{8A2ACDF8-E835-BFEB-2E45-E81A3F2541A1}"/>
+                <a16:creationId xmlns:a16="http://schemas.microsoft.com/office/drawing/2014/main" id="{B3BAA765-2C4C-A810-E691-FCFBDC03E483}"/>
               </a:ext>
             </a:extLst>
           </p:cNvPr>
@@ -1203,7 +1748,7 @@
           <a:bodyPr/>
           <a:lstStyle/>
           <a:p>
-            <a:fld id="{9DEE18FE-2860-EC4B-B6BB-21326898EEB6}" type="slidenum">
+            <a:fld id="{9FF3D289-ED7F-C541-B791-80E90E528BBE}" type="slidenum">
               <a:rPr lang="en-US" smtClean="0"/>
               <a:t>‹#›</a:t>
             </a:fld>
@@ -1214,7 +1759,7 @@
     </p:spTree>
     <p:extLst>
       <p:ext uri="{BB962C8B-B14F-4D97-AF65-F5344CB8AC3E}">
-        <p14:creationId xmlns:p14="http://schemas.microsoft.com/office/powerpoint/2010/main" val="3874590670"/>
+        <p14:creationId xmlns:p14="http://schemas.microsoft.com/office/powerpoint/2010/main" val="2912055073"/>
       </p:ext>
     </p:extLst>
   </p:cSld>
@@ -1246,7 +1791,7 @@
           <p:cNvPr id="2" name="Title 1">
             <a:extLst>
               <a:ext uri="{FF2B5EF4-FFF2-40B4-BE49-F238E27FC236}">
-                <a16:creationId xmlns:a16="http://schemas.microsoft.com/office/drawing/2014/main" id="{8C07A7DE-E60F-A12E-1F9B-FF26EE6D9E6A}"/>
+                <a16:creationId xmlns:a16="http://schemas.microsoft.com/office/drawing/2014/main" id="{58F84A3D-23B7-5960-F725-BBCC3627EB2F}"/>
               </a:ext>
             </a:extLst>
           </p:cNvPr>
@@ -1275,7 +1820,7 @@
           <p:cNvPr id="3" name="Content Placeholder 2">
             <a:extLst>
               <a:ext uri="{FF2B5EF4-FFF2-40B4-BE49-F238E27FC236}">
-                <a16:creationId xmlns:a16="http://schemas.microsoft.com/office/drawing/2014/main" id="{5F7CFB60-0567-DA28-7F16-8B5549895E00}"/>
+                <a16:creationId xmlns:a16="http://schemas.microsoft.com/office/drawing/2014/main" id="{6EB27B78-056E-32CF-A6C0-9DB5359A0EC8}"/>
               </a:ext>
             </a:extLst>
           </p:cNvPr>
@@ -1338,7 +1883,7 @@
           <p:cNvPr id="4" name="Content Placeholder 3">
             <a:extLst>
               <a:ext uri="{FF2B5EF4-FFF2-40B4-BE49-F238E27FC236}">
-                <a16:creationId xmlns:a16="http://schemas.microsoft.com/office/drawing/2014/main" id="{D6AB2792-5812-6754-0633-5B5A600A3ABD}"/>
+                <a16:creationId xmlns:a16="http://schemas.microsoft.com/office/drawing/2014/main" id="{89BC6EF3-6BA8-727B-7898-443BFB13E6A0}"/>
               </a:ext>
             </a:extLst>
           </p:cNvPr>
@@ -1401,7 +1946,7 @@
           <p:cNvPr id="5" name="Date Placeholder 4">
             <a:extLst>
               <a:ext uri="{FF2B5EF4-FFF2-40B4-BE49-F238E27FC236}">
-                <a16:creationId xmlns:a16="http://schemas.microsoft.com/office/drawing/2014/main" id="{9DC25EC9-7917-2DFB-E755-13ECAA97C955}"/>
+                <a16:creationId xmlns:a16="http://schemas.microsoft.com/office/drawing/2014/main" id="{E226E3E2-4DD9-2D4D-3D28-C4BB46976285}"/>
               </a:ext>
             </a:extLst>
           </p:cNvPr>
@@ -1417,9 +1962,9 @@
           <a:bodyPr/>
           <a:lstStyle/>
           <a:p>
-            <a:fld id="{A9B84BE5-C4F7-2347-BA74-2B6E17D1C756}" type="datetimeFigureOut">
+            <a:fld id="{6B84627A-7341-2945-9FBD-76ADD0571C52}" type="datetimeFigureOut">
               <a:rPr lang="en-US" smtClean="0"/>
-              <a:t>1/13/26</a:t>
+              <a:t>1/14/26</a:t>
             </a:fld>
             <a:endParaRPr lang="en-US"/>
           </a:p>
@@ -1430,7 +1975,7 @@
           <p:cNvPr id="6" name="Footer Placeholder 5">
             <a:extLst>
               <a:ext uri="{FF2B5EF4-FFF2-40B4-BE49-F238E27FC236}">
-                <a16:creationId xmlns:a16="http://schemas.microsoft.com/office/drawing/2014/main" id="{753679C1-2ADC-F590-9B1E-D94FA2B954A2}"/>
+                <a16:creationId xmlns:a16="http://schemas.microsoft.com/office/drawing/2014/main" id="{8EA949C1-AC8B-B23D-CB06-46B8EBC611E8}"/>
               </a:ext>
             </a:extLst>
           </p:cNvPr>
@@ -1455,7 +2000,7 @@
           <p:cNvPr id="7" name="Slide Number Placeholder 6">
             <a:extLst>
               <a:ext uri="{FF2B5EF4-FFF2-40B4-BE49-F238E27FC236}">
-                <a16:creationId xmlns:a16="http://schemas.microsoft.com/office/drawing/2014/main" id="{A06BA2A8-5CE6-D208-C19F-B18F380531BB}"/>
+                <a16:creationId xmlns:a16="http://schemas.microsoft.com/office/drawing/2014/main" id="{8056798C-2E5B-0F3C-C5B6-F58684A10A53}"/>
               </a:ext>
             </a:extLst>
           </p:cNvPr>
@@ -1471,7 +2016,7 @@
           <a:bodyPr/>
           <a:lstStyle/>
           <a:p>
-            <a:fld id="{9DEE18FE-2860-EC4B-B6BB-21326898EEB6}" type="slidenum">
+            <a:fld id="{9FF3D289-ED7F-C541-B791-80E90E528BBE}" type="slidenum">
               <a:rPr lang="en-US" smtClean="0"/>
               <a:t>‹#›</a:t>
             </a:fld>
@@ -1482,7 +2027,7 @@
     </p:spTree>
     <p:extLst>
       <p:ext uri="{BB962C8B-B14F-4D97-AF65-F5344CB8AC3E}">
-        <p14:creationId xmlns:p14="http://schemas.microsoft.com/office/powerpoint/2010/main" val="2741193752"/>
+        <p14:creationId xmlns:p14="http://schemas.microsoft.com/office/powerpoint/2010/main" val="2401496425"/>
       </p:ext>
     </p:extLst>
   </p:cSld>
@@ -1514,7 +2059,7 @@
           <p:cNvPr id="2" name="Title 1">
             <a:extLst>
               <a:ext uri="{FF2B5EF4-FFF2-40B4-BE49-F238E27FC236}">
-                <a16:creationId xmlns:a16="http://schemas.microsoft.com/office/drawing/2014/main" id="{C66C8738-A55E-3A6B-EBDE-F99A673C1809}"/>
+                <a16:creationId xmlns:a16="http://schemas.microsoft.com/office/drawing/2014/main" id="{9E4665C1-9922-9B04-CD54-C7BCC907DFA4}"/>
               </a:ext>
             </a:extLst>
           </p:cNvPr>
@@ -1548,7 +2093,7 @@
           <p:cNvPr id="3" name="Text Placeholder 2">
             <a:extLst>
               <a:ext uri="{FF2B5EF4-FFF2-40B4-BE49-F238E27FC236}">
-                <a16:creationId xmlns:a16="http://schemas.microsoft.com/office/drawing/2014/main" id="{B3C88401-61A8-2C4C-2FDB-E89DC1CD2CFD}"/>
+                <a16:creationId xmlns:a16="http://schemas.microsoft.com/office/drawing/2014/main" id="{2E1CF765-3982-05C4-0FBC-35E19444DD09}"/>
               </a:ext>
             </a:extLst>
           </p:cNvPr>
@@ -1619,7 +2164,7 @@
           <p:cNvPr id="4" name="Content Placeholder 3">
             <a:extLst>
               <a:ext uri="{FF2B5EF4-FFF2-40B4-BE49-F238E27FC236}">
-                <a16:creationId xmlns:a16="http://schemas.microsoft.com/office/drawing/2014/main" id="{C55EF84E-E92F-60A3-5E4D-6A2BD1C3D2AC}"/>
+                <a16:creationId xmlns:a16="http://schemas.microsoft.com/office/drawing/2014/main" id="{587A4A77-9FD8-A5E4-2EA2-1CB1E9CC9B81}"/>
               </a:ext>
             </a:extLst>
           </p:cNvPr>
@@ -1682,7 +2227,7 @@
           <p:cNvPr id="5" name="Text Placeholder 4">
             <a:extLst>
               <a:ext uri="{FF2B5EF4-FFF2-40B4-BE49-F238E27FC236}">
-                <a16:creationId xmlns:a16="http://schemas.microsoft.com/office/drawing/2014/main" id="{C07B906A-A452-7204-F846-2FCC0F64FFD9}"/>
+                <a16:creationId xmlns:a16="http://schemas.microsoft.com/office/drawing/2014/main" id="{E55BA077-2E2E-DBE9-0D73-E320E24322CD}"/>
               </a:ext>
             </a:extLst>
           </p:cNvPr>
@@ -1753,7 +2298,7 @@
           <p:cNvPr id="6" name="Content Placeholder 5">
             <a:extLst>
               <a:ext uri="{FF2B5EF4-FFF2-40B4-BE49-F238E27FC236}">
-                <a16:creationId xmlns:a16="http://schemas.microsoft.com/office/drawing/2014/main" id="{13DCB63F-C357-B01A-0F37-D6E78F8889EB}"/>
+                <a16:creationId xmlns:a16="http://schemas.microsoft.com/office/drawing/2014/main" id="{E6CA8DB4-E3CA-417B-72BF-83C73029E29F}"/>
               </a:ext>
             </a:extLst>
           </p:cNvPr>
@@ -1816,7 +2361,7 @@
           <p:cNvPr id="7" name="Date Placeholder 6">
             <a:extLst>
               <a:ext uri="{FF2B5EF4-FFF2-40B4-BE49-F238E27FC236}">
-                <a16:creationId xmlns:a16="http://schemas.microsoft.com/office/drawing/2014/main" id="{67C8491B-E880-6BD3-376D-83B229DFDF48}"/>
+                <a16:creationId xmlns:a16="http://schemas.microsoft.com/office/drawing/2014/main" id="{EA1F30F8-47AF-46BE-6800-0EF56050F015}"/>
               </a:ext>
             </a:extLst>
           </p:cNvPr>
@@ -1832,9 +2377,9 @@
           <a:bodyPr/>
           <a:lstStyle/>
           <a:p>
-            <a:fld id="{A9B84BE5-C4F7-2347-BA74-2B6E17D1C756}" type="datetimeFigureOut">
+            <a:fld id="{6B84627A-7341-2945-9FBD-76ADD0571C52}" type="datetimeFigureOut">
               <a:rPr lang="en-US" smtClean="0"/>
-              <a:t>1/13/26</a:t>
+              <a:t>1/14/26</a:t>
             </a:fld>
             <a:endParaRPr lang="en-US"/>
           </a:p>
@@ -1845,7 +2390,7 @@
           <p:cNvPr id="8" name="Footer Placeholder 7">
             <a:extLst>
               <a:ext uri="{FF2B5EF4-FFF2-40B4-BE49-F238E27FC236}">
-                <a16:creationId xmlns:a16="http://schemas.microsoft.com/office/drawing/2014/main" id="{BC672B86-98BD-A832-3A27-5B60EA223F64}"/>
+                <a16:creationId xmlns:a16="http://schemas.microsoft.com/office/drawing/2014/main" id="{FB1F97D2-0E57-E8E1-86A6-E5A042AFC2C1}"/>
               </a:ext>
             </a:extLst>
           </p:cNvPr>
@@ -1870,7 +2415,7 @@
           <p:cNvPr id="9" name="Slide Number Placeholder 8">
             <a:extLst>
               <a:ext uri="{FF2B5EF4-FFF2-40B4-BE49-F238E27FC236}">
-                <a16:creationId xmlns:a16="http://schemas.microsoft.com/office/drawing/2014/main" id="{DBEBA284-0A27-9245-6A2F-770B8279F9AB}"/>
+                <a16:creationId xmlns:a16="http://schemas.microsoft.com/office/drawing/2014/main" id="{5CD8FDC3-50B9-1D80-D64E-D4BA0136E99B}"/>
               </a:ext>
             </a:extLst>
           </p:cNvPr>
@@ -1886,7 +2431,7 @@
           <a:bodyPr/>
           <a:lstStyle/>
           <a:p>
-            <a:fld id="{9DEE18FE-2860-EC4B-B6BB-21326898EEB6}" type="slidenum">
+            <a:fld id="{9FF3D289-ED7F-C541-B791-80E90E528BBE}" type="slidenum">
               <a:rPr lang="en-US" smtClean="0"/>
               <a:t>‹#›</a:t>
             </a:fld>
@@ -1897,7 +2442,7 @@
     </p:spTree>
     <p:extLst>
       <p:ext uri="{BB962C8B-B14F-4D97-AF65-F5344CB8AC3E}">
-        <p14:creationId xmlns:p14="http://schemas.microsoft.com/office/powerpoint/2010/main" val="883957506"/>
+        <p14:creationId xmlns:p14="http://schemas.microsoft.com/office/powerpoint/2010/main" val="2158116840"/>
       </p:ext>
     </p:extLst>
   </p:cSld>
@@ -1929,7 +2474,7 @@
           <p:cNvPr id="2" name="Title 1">
             <a:extLst>
               <a:ext uri="{FF2B5EF4-FFF2-40B4-BE49-F238E27FC236}">
-                <a16:creationId xmlns:a16="http://schemas.microsoft.com/office/drawing/2014/main" id="{F08AC8DD-C246-037D-9815-D6DD67C7F1E5}"/>
+                <a16:creationId xmlns:a16="http://schemas.microsoft.com/office/drawing/2014/main" id="{DBB1B04A-12F0-99B0-677F-D74797395084}"/>
               </a:ext>
             </a:extLst>
           </p:cNvPr>
@@ -1958,7 +2503,7 @@
           <p:cNvPr id="3" name="Date Placeholder 2">
             <a:extLst>
               <a:ext uri="{FF2B5EF4-FFF2-40B4-BE49-F238E27FC236}">
-                <a16:creationId xmlns:a16="http://schemas.microsoft.com/office/drawing/2014/main" id="{F7FBC0BF-8C60-E778-B9D4-539368F3945A}"/>
+                <a16:creationId xmlns:a16="http://schemas.microsoft.com/office/drawing/2014/main" id="{2EE78748-6E61-40E0-CC8D-4AC01336F535}"/>
               </a:ext>
             </a:extLst>
           </p:cNvPr>
@@ -1974,9 +2519,9 @@
           <a:bodyPr/>
           <a:lstStyle/>
           <a:p>
-            <a:fld id="{A9B84BE5-C4F7-2347-BA74-2B6E17D1C756}" type="datetimeFigureOut">
+            <a:fld id="{6B84627A-7341-2945-9FBD-76ADD0571C52}" type="datetimeFigureOut">
               <a:rPr lang="en-US" smtClean="0"/>
-              <a:t>1/13/26</a:t>
+              <a:t>1/14/26</a:t>
             </a:fld>
             <a:endParaRPr lang="en-US"/>
           </a:p>
@@ -1987,7 +2532,7 @@
           <p:cNvPr id="4" name="Footer Placeholder 3">
             <a:extLst>
               <a:ext uri="{FF2B5EF4-FFF2-40B4-BE49-F238E27FC236}">
-                <a16:creationId xmlns:a16="http://schemas.microsoft.com/office/drawing/2014/main" id="{E9B6DFF0-EC3C-3C95-1DB9-7E64452293A6}"/>
+                <a16:creationId xmlns:a16="http://schemas.microsoft.com/office/drawing/2014/main" id="{4D506E3D-8F20-3086-8021-A7CF302E9504}"/>
               </a:ext>
             </a:extLst>
           </p:cNvPr>
@@ -2012,7 +2557,7 @@
           <p:cNvPr id="5" name="Slide Number Placeholder 4">
             <a:extLst>
               <a:ext uri="{FF2B5EF4-FFF2-40B4-BE49-F238E27FC236}">
-                <a16:creationId xmlns:a16="http://schemas.microsoft.com/office/drawing/2014/main" id="{31BE68C1-9FFE-8D71-09E7-51BF6B9796E8}"/>
+                <a16:creationId xmlns:a16="http://schemas.microsoft.com/office/drawing/2014/main" id="{6E0C97CA-6467-0082-B30B-42C9B985FB7C}"/>
               </a:ext>
             </a:extLst>
           </p:cNvPr>
@@ -2028,7 +2573,7 @@
           <a:bodyPr/>
           <a:lstStyle/>
           <a:p>
-            <a:fld id="{9DEE18FE-2860-EC4B-B6BB-21326898EEB6}" type="slidenum">
+            <a:fld id="{9FF3D289-ED7F-C541-B791-80E90E528BBE}" type="slidenum">
               <a:rPr lang="en-US" smtClean="0"/>
               <a:t>‹#›</a:t>
             </a:fld>
@@ -2039,7 +2584,7 @@
     </p:spTree>
     <p:extLst>
       <p:ext uri="{BB962C8B-B14F-4D97-AF65-F5344CB8AC3E}">
-        <p14:creationId xmlns:p14="http://schemas.microsoft.com/office/powerpoint/2010/main" val="3781185246"/>
+        <p14:creationId xmlns:p14="http://schemas.microsoft.com/office/powerpoint/2010/main" val="721260010"/>
       </p:ext>
     </p:extLst>
   </p:cSld>
@@ -2071,7 +2616,7 @@
           <p:cNvPr id="2" name="Date Placeholder 1">
             <a:extLst>
               <a:ext uri="{FF2B5EF4-FFF2-40B4-BE49-F238E27FC236}">
-                <a16:creationId xmlns:a16="http://schemas.microsoft.com/office/drawing/2014/main" id="{C9BE4039-08B2-31A9-C184-0659D39109B4}"/>
+                <a16:creationId xmlns:a16="http://schemas.microsoft.com/office/drawing/2014/main" id="{1CC695D4-BB6B-2EF4-58A2-F7CD4575FA4C}"/>
               </a:ext>
             </a:extLst>
           </p:cNvPr>
@@ -2087,9 +2632,9 @@
           <a:bodyPr/>
           <a:lstStyle/>
           <a:p>
-            <a:fld id="{A9B84BE5-C4F7-2347-BA74-2B6E17D1C756}" type="datetimeFigureOut">
+            <a:fld id="{6B84627A-7341-2945-9FBD-76ADD0571C52}" type="datetimeFigureOut">
               <a:rPr lang="en-US" smtClean="0"/>
-              <a:t>1/13/26</a:t>
+              <a:t>1/14/26</a:t>
             </a:fld>
             <a:endParaRPr lang="en-US"/>
           </a:p>
@@ -2100,7 +2645,7 @@
           <p:cNvPr id="3" name="Footer Placeholder 2">
             <a:extLst>
               <a:ext uri="{FF2B5EF4-FFF2-40B4-BE49-F238E27FC236}">
-                <a16:creationId xmlns:a16="http://schemas.microsoft.com/office/drawing/2014/main" id="{193BB83F-27B9-5F56-D853-53735E9100E6}"/>
+                <a16:creationId xmlns:a16="http://schemas.microsoft.com/office/drawing/2014/main" id="{5550AF39-3D8D-74F6-CA56-2202833252E7}"/>
               </a:ext>
             </a:extLst>
           </p:cNvPr>
@@ -2125,7 +2670,7 @@
           <p:cNvPr id="4" name="Slide Number Placeholder 3">
             <a:extLst>
               <a:ext uri="{FF2B5EF4-FFF2-40B4-BE49-F238E27FC236}">
-                <a16:creationId xmlns:a16="http://schemas.microsoft.com/office/drawing/2014/main" id="{AC5BB40C-9187-57AA-3AFA-4F6F25B96880}"/>
+                <a16:creationId xmlns:a16="http://schemas.microsoft.com/office/drawing/2014/main" id="{E9317922-0914-2041-B341-7A7349DF42E3}"/>
               </a:ext>
             </a:extLst>
           </p:cNvPr>
@@ -2141,7 +2686,7 @@
           <a:bodyPr/>
           <a:lstStyle/>
           <a:p>
-            <a:fld id="{9DEE18FE-2860-EC4B-B6BB-21326898EEB6}" type="slidenum">
+            <a:fld id="{9FF3D289-ED7F-C541-B791-80E90E528BBE}" type="slidenum">
               <a:rPr lang="en-US" smtClean="0"/>
               <a:t>‹#›</a:t>
             </a:fld>
@@ -2152,7 +2697,7 @@
     </p:spTree>
     <p:extLst>
       <p:ext uri="{BB962C8B-B14F-4D97-AF65-F5344CB8AC3E}">
-        <p14:creationId xmlns:p14="http://schemas.microsoft.com/office/powerpoint/2010/main" val="2448536814"/>
+        <p14:creationId xmlns:p14="http://schemas.microsoft.com/office/powerpoint/2010/main" val="3980649403"/>
       </p:ext>
     </p:extLst>
   </p:cSld>
@@ -2184,7 +2729,7 @@
           <p:cNvPr id="2" name="Title 1">
             <a:extLst>
               <a:ext uri="{FF2B5EF4-FFF2-40B4-BE49-F238E27FC236}">
-                <a16:creationId xmlns:a16="http://schemas.microsoft.com/office/drawing/2014/main" id="{7EAD0DAE-9181-6235-3333-447CD8C3B19C}"/>
+                <a16:creationId xmlns:a16="http://schemas.microsoft.com/office/drawing/2014/main" id="{A19CCBCC-AC42-14A0-CEE5-336F20805FF7}"/>
               </a:ext>
             </a:extLst>
           </p:cNvPr>
@@ -2222,7 +2767,7 @@
           <p:cNvPr id="3" name="Content Placeholder 2">
             <a:extLst>
               <a:ext uri="{FF2B5EF4-FFF2-40B4-BE49-F238E27FC236}">
-                <a16:creationId xmlns:a16="http://schemas.microsoft.com/office/drawing/2014/main" id="{181E9CEA-47AF-27AF-3887-C9602C79BB6F}"/>
+                <a16:creationId xmlns:a16="http://schemas.microsoft.com/office/drawing/2014/main" id="{E10215C1-33C6-2AF3-A48A-9947DC4952C5}"/>
               </a:ext>
             </a:extLst>
           </p:cNvPr>
@@ -2313,7 +2858,7 @@
           <p:cNvPr id="4" name="Text Placeholder 3">
             <a:extLst>
               <a:ext uri="{FF2B5EF4-FFF2-40B4-BE49-F238E27FC236}">
-                <a16:creationId xmlns:a16="http://schemas.microsoft.com/office/drawing/2014/main" id="{50DFED53-9674-9758-E1FC-C90FD60C3FF9}"/>
+                <a16:creationId xmlns:a16="http://schemas.microsoft.com/office/drawing/2014/main" id="{EDBA7FE6-A6D0-79A0-7D68-71F66616F0E3}"/>
               </a:ext>
             </a:extLst>
           </p:cNvPr>
@@ -2384,7 +2929,7 @@
           <p:cNvPr id="5" name="Date Placeholder 4">
             <a:extLst>
               <a:ext uri="{FF2B5EF4-FFF2-40B4-BE49-F238E27FC236}">
-                <a16:creationId xmlns:a16="http://schemas.microsoft.com/office/drawing/2014/main" id="{80F7047A-2E24-9379-2DEB-EE04F9C41CA1}"/>
+                <a16:creationId xmlns:a16="http://schemas.microsoft.com/office/drawing/2014/main" id="{618B6450-9856-5617-23BF-6A12B8A721F4}"/>
               </a:ext>
             </a:extLst>
           </p:cNvPr>
@@ -2400,9 +2945,9 @@
           <a:bodyPr/>
           <a:lstStyle/>
           <a:p>
-            <a:fld id="{A9B84BE5-C4F7-2347-BA74-2B6E17D1C756}" type="datetimeFigureOut">
+            <a:fld id="{6B84627A-7341-2945-9FBD-76ADD0571C52}" type="datetimeFigureOut">
               <a:rPr lang="en-US" smtClean="0"/>
-              <a:t>1/13/26</a:t>
+              <a:t>1/14/26</a:t>
             </a:fld>
             <a:endParaRPr lang="en-US"/>
           </a:p>
@@ -2413,7 +2958,7 @@
           <p:cNvPr id="6" name="Footer Placeholder 5">
             <a:extLst>
               <a:ext uri="{FF2B5EF4-FFF2-40B4-BE49-F238E27FC236}">
-                <a16:creationId xmlns:a16="http://schemas.microsoft.com/office/drawing/2014/main" id="{ADB1DF4B-4B8E-494A-24DA-8BD0DF5EF9DF}"/>
+                <a16:creationId xmlns:a16="http://schemas.microsoft.com/office/drawing/2014/main" id="{E99CF6A3-448C-8D3E-1A90-3A3B15D8A48E}"/>
               </a:ext>
             </a:extLst>
           </p:cNvPr>
@@ -2438,7 +2983,7 @@
           <p:cNvPr id="7" name="Slide Number Placeholder 6">
             <a:extLst>
               <a:ext uri="{FF2B5EF4-FFF2-40B4-BE49-F238E27FC236}">
-                <a16:creationId xmlns:a16="http://schemas.microsoft.com/office/drawing/2014/main" id="{57AF96E4-1672-1740-75E5-2B960764831F}"/>
+                <a16:creationId xmlns:a16="http://schemas.microsoft.com/office/drawing/2014/main" id="{DF626147-4445-B3DB-009D-1498F6508270}"/>
               </a:ext>
             </a:extLst>
           </p:cNvPr>
@@ -2454,7 +2999,7 @@
           <a:bodyPr/>
           <a:lstStyle/>
           <a:p>
-            <a:fld id="{9DEE18FE-2860-EC4B-B6BB-21326898EEB6}" type="slidenum">
+            <a:fld id="{9FF3D289-ED7F-C541-B791-80E90E528BBE}" type="slidenum">
               <a:rPr lang="en-US" smtClean="0"/>
               <a:t>‹#›</a:t>
             </a:fld>
@@ -2465,7 +3010,7 @@
     </p:spTree>
     <p:extLst>
       <p:ext uri="{BB962C8B-B14F-4D97-AF65-F5344CB8AC3E}">
-        <p14:creationId xmlns:p14="http://schemas.microsoft.com/office/powerpoint/2010/main" val="2892240971"/>
+        <p14:creationId xmlns:p14="http://schemas.microsoft.com/office/powerpoint/2010/main" val="1228299377"/>
       </p:ext>
     </p:extLst>
   </p:cSld>
@@ -2497,7 +3042,7 @@
           <p:cNvPr id="2" name="Title 1">
             <a:extLst>
               <a:ext uri="{FF2B5EF4-FFF2-40B4-BE49-F238E27FC236}">
-                <a16:creationId xmlns:a16="http://schemas.microsoft.com/office/drawing/2014/main" id="{E99906AE-4AB1-C306-DE6F-E83A8D7B59A0}"/>
+                <a16:creationId xmlns:a16="http://schemas.microsoft.com/office/drawing/2014/main" id="{A61CB248-BE49-6641-B4BC-CA78D91C7DFE}"/>
               </a:ext>
             </a:extLst>
           </p:cNvPr>
@@ -2535,7 +3080,7 @@
           <p:cNvPr id="3" name="Picture Placeholder 2">
             <a:extLst>
               <a:ext uri="{FF2B5EF4-FFF2-40B4-BE49-F238E27FC236}">
-                <a16:creationId xmlns:a16="http://schemas.microsoft.com/office/drawing/2014/main" id="{9D22D5D1-BBCE-97BD-241F-FBA7C8E13568}"/>
+                <a16:creationId xmlns:a16="http://schemas.microsoft.com/office/drawing/2014/main" id="{0F2D6E70-9D3D-A681-63D9-47C0960D9F50}"/>
               </a:ext>
             </a:extLst>
           </p:cNvPr>
@@ -2602,7 +3147,7 @@
           <p:cNvPr id="4" name="Text Placeholder 3">
             <a:extLst>
               <a:ext uri="{FF2B5EF4-FFF2-40B4-BE49-F238E27FC236}">
-                <a16:creationId xmlns:a16="http://schemas.microsoft.com/office/drawing/2014/main" id="{2C59D274-4C4E-8464-2906-E59D5B49C3E7}"/>
+                <a16:creationId xmlns:a16="http://schemas.microsoft.com/office/drawing/2014/main" id="{86CC82DD-7AD5-A6D2-5D4A-D0B77A0D20A1}"/>
               </a:ext>
             </a:extLst>
           </p:cNvPr>
@@ -2673,7 +3218,7 @@
           <p:cNvPr id="5" name="Date Placeholder 4">
             <a:extLst>
               <a:ext uri="{FF2B5EF4-FFF2-40B4-BE49-F238E27FC236}">
-                <a16:creationId xmlns:a16="http://schemas.microsoft.com/office/drawing/2014/main" id="{F40D72CF-A731-50B6-72AF-3ED8F44FF01B}"/>
+                <a16:creationId xmlns:a16="http://schemas.microsoft.com/office/drawing/2014/main" id="{FBF678B7-1AA9-44B2-2437-9D8A1110C35C}"/>
               </a:ext>
             </a:extLst>
           </p:cNvPr>
@@ -2689,9 +3234,9 @@
           <a:bodyPr/>
           <a:lstStyle/>
           <a:p>
-            <a:fld id="{A9B84BE5-C4F7-2347-BA74-2B6E17D1C756}" type="datetimeFigureOut">
+            <a:fld id="{6B84627A-7341-2945-9FBD-76ADD0571C52}" type="datetimeFigureOut">
               <a:rPr lang="en-US" smtClean="0"/>
-              <a:t>1/13/26</a:t>
+              <a:t>1/14/26</a:t>
             </a:fld>
             <a:endParaRPr lang="en-US"/>
           </a:p>
@@ -2702,7 +3247,7 @@
           <p:cNvPr id="6" name="Footer Placeholder 5">
             <a:extLst>
               <a:ext uri="{FF2B5EF4-FFF2-40B4-BE49-F238E27FC236}">
-                <a16:creationId xmlns:a16="http://schemas.microsoft.com/office/drawing/2014/main" id="{98A0578D-FA27-CB96-F5AF-61387A151D77}"/>
+                <a16:creationId xmlns:a16="http://schemas.microsoft.com/office/drawing/2014/main" id="{A9D77B03-058B-5733-D9CF-950B7D2393C2}"/>
               </a:ext>
             </a:extLst>
           </p:cNvPr>
@@ -2727,7 +3272,7 @@
           <p:cNvPr id="7" name="Slide Number Placeholder 6">
             <a:extLst>
               <a:ext uri="{FF2B5EF4-FFF2-40B4-BE49-F238E27FC236}">
-                <a16:creationId xmlns:a16="http://schemas.microsoft.com/office/drawing/2014/main" id="{C0E656D3-92E2-C48B-FD0B-B0C957DD90C4}"/>
+                <a16:creationId xmlns:a16="http://schemas.microsoft.com/office/drawing/2014/main" id="{1EAB0524-828E-C471-43A6-34B6F78A1F74}"/>
               </a:ext>
             </a:extLst>
           </p:cNvPr>
@@ -2743,7 +3288,7 @@
           <a:bodyPr/>
           <a:lstStyle/>
           <a:p>
-            <a:fld id="{9DEE18FE-2860-EC4B-B6BB-21326898EEB6}" type="slidenum">
+            <a:fld id="{9FF3D289-ED7F-C541-B791-80E90E528BBE}" type="slidenum">
               <a:rPr lang="en-US" smtClean="0"/>
               <a:t>‹#›</a:t>
             </a:fld>
@@ -2754,7 +3299,7 @@
     </p:spTree>
     <p:extLst>
       <p:ext uri="{BB962C8B-B14F-4D97-AF65-F5344CB8AC3E}">
-        <p14:creationId xmlns:p14="http://schemas.microsoft.com/office/powerpoint/2010/main" val="3729825667"/>
+        <p14:creationId xmlns:p14="http://schemas.microsoft.com/office/powerpoint/2010/main" val="2598917810"/>
       </p:ext>
     </p:extLst>
   </p:cSld>
@@ -2791,7 +3336,7 @@
           <p:cNvPr id="2" name="Title Placeholder 1">
             <a:extLst>
               <a:ext uri="{FF2B5EF4-FFF2-40B4-BE49-F238E27FC236}">
-                <a16:creationId xmlns:a16="http://schemas.microsoft.com/office/drawing/2014/main" id="{7B9D3F21-4C1A-F05A-99AA-1FA1540B373A}"/>
+                <a16:creationId xmlns:a16="http://schemas.microsoft.com/office/drawing/2014/main" id="{29820A99-6553-9993-385D-CAA55E1FF2F2}"/>
               </a:ext>
             </a:extLst>
           </p:cNvPr>
@@ -2830,7 +3375,7 @@
           <p:cNvPr id="3" name="Text Placeholder 2">
             <a:extLst>
               <a:ext uri="{FF2B5EF4-FFF2-40B4-BE49-F238E27FC236}">
-                <a16:creationId xmlns:a16="http://schemas.microsoft.com/office/drawing/2014/main" id="{554BB805-769A-9129-46B0-D05179591296}"/>
+                <a16:creationId xmlns:a16="http://schemas.microsoft.com/office/drawing/2014/main" id="{EC65BA21-4DFE-336F-81D7-5D58A8A2CBB1}"/>
               </a:ext>
             </a:extLst>
           </p:cNvPr>
@@ -2898,7 +3443,7 @@
           <p:cNvPr id="4" name="Date Placeholder 3">
             <a:extLst>
               <a:ext uri="{FF2B5EF4-FFF2-40B4-BE49-F238E27FC236}">
-                <a16:creationId xmlns:a16="http://schemas.microsoft.com/office/drawing/2014/main" id="{79D8F7CC-E72D-E3EF-98FC-237999843338}"/>
+                <a16:creationId xmlns:a16="http://schemas.microsoft.com/office/drawing/2014/main" id="{8BD6A4C8-60F6-EC25-71BA-DFDB81997B8C}"/>
               </a:ext>
             </a:extLst>
           </p:cNvPr>
@@ -2932,9 +3477,9 @@
             </a:lvl1pPr>
           </a:lstStyle>
           <a:p>
-            <a:fld id="{A9B84BE5-C4F7-2347-BA74-2B6E17D1C756}" type="datetimeFigureOut">
+            <a:fld id="{6B84627A-7341-2945-9FBD-76ADD0571C52}" type="datetimeFigureOut">
               <a:rPr lang="en-US" smtClean="0"/>
-              <a:t>1/13/26</a:t>
+              <a:t>1/14/26</a:t>
             </a:fld>
             <a:endParaRPr lang="en-US"/>
           </a:p>
@@ -2945,7 +3490,7 @@
           <p:cNvPr id="5" name="Footer Placeholder 4">
             <a:extLst>
               <a:ext uri="{FF2B5EF4-FFF2-40B4-BE49-F238E27FC236}">
-                <a16:creationId xmlns:a16="http://schemas.microsoft.com/office/drawing/2014/main" id="{243BA93C-E1C4-E100-4D25-4714DDE57FEB}"/>
+                <a16:creationId xmlns:a16="http://schemas.microsoft.com/office/drawing/2014/main" id="{33716770-37D5-C817-CB37-11FD37627039}"/>
               </a:ext>
             </a:extLst>
           </p:cNvPr>
@@ -2988,7 +3533,7 @@
           <p:cNvPr id="6" name="Slide Number Placeholder 5">
             <a:extLst>
               <a:ext uri="{FF2B5EF4-FFF2-40B4-BE49-F238E27FC236}">
-                <a16:creationId xmlns:a16="http://schemas.microsoft.com/office/drawing/2014/main" id="{31C5D664-A89B-8D82-808F-E4BA3E29D797}"/>
+                <a16:creationId xmlns:a16="http://schemas.microsoft.com/office/drawing/2014/main" id="{742254FF-A806-ADA2-43AD-0DEBE1E059B1}"/>
               </a:ext>
             </a:extLst>
           </p:cNvPr>
@@ -3022,7 +3567,7 @@
             </a:lvl1pPr>
           </a:lstStyle>
           <a:p>
-            <a:fld id="{9DEE18FE-2860-EC4B-B6BB-21326898EEB6}" type="slidenum">
+            <a:fld id="{9FF3D289-ED7F-C541-B791-80E90E528BBE}" type="slidenum">
               <a:rPr lang="en-US" smtClean="0"/>
               <a:t>‹#›</a:t>
             </a:fld>
@@ -3033,7 +3578,7 @@
     </p:spTree>
     <p:extLst>
       <p:ext uri="{BB962C8B-B14F-4D97-AF65-F5344CB8AC3E}">
-        <p14:creationId xmlns:p14="http://schemas.microsoft.com/office/powerpoint/2010/main" val="1770418370"/>
+        <p14:creationId xmlns:p14="http://schemas.microsoft.com/office/powerpoint/2010/main" val="1708617420"/>
       </p:ext>
     </p:extLst>
   </p:cSld>
@@ -3353,10 +3898,10 @@
       </p:grpSpPr>
       <p:pic>
         <p:nvPicPr>
-          <p:cNvPr id="7" name="Picture 6" descr="A blue background with white text&#10;&#10;AI-generated content may be incorrect.">
-            <a:extLst>
-              <a:ext uri="{FF2B5EF4-FFF2-40B4-BE49-F238E27FC236}">
-                <a16:creationId xmlns:a16="http://schemas.microsoft.com/office/drawing/2014/main" id="{AD9C3E9E-0789-B128-D0DE-BEA5C095EFE5}"/>
+          <p:cNvPr id="7" name="Picture 6" descr="A screenshot of a computer&#10;&#10;AI-generated content may be incorrect.">
+            <a:extLst>
+              <a:ext uri="{FF2B5EF4-FFF2-40B4-BE49-F238E27FC236}">
+                <a16:creationId xmlns:a16="http://schemas.microsoft.com/office/drawing/2014/main" id="{5DAAB560-CE9E-5977-A69D-131A9B108213}"/>
               </a:ext>
             </a:extLst>
           </p:cNvPr>
@@ -3373,8 +3918,8 @@
         </p:blipFill>
         <p:spPr>
           <a:xfrm>
-            <a:off x="-202163" y="-247134"/>
-            <a:ext cx="12955303" cy="7296664"/>
+            <a:off x="-1" y="-51760"/>
+            <a:ext cx="12420075" cy="6909759"/>
           </a:xfrm>
           <a:prstGeom prst="rect">
             <a:avLst/>
@@ -3384,7 +3929,73 @@
     </p:spTree>
     <p:extLst>
       <p:ext uri="{BB962C8B-B14F-4D97-AF65-F5344CB8AC3E}">
-        <p14:creationId xmlns:p14="http://schemas.microsoft.com/office/powerpoint/2010/main" val="1335769096"/>
+        <p14:creationId xmlns:p14="http://schemas.microsoft.com/office/powerpoint/2010/main" val="2199630902"/>
+      </p:ext>
+    </p:extLst>
+  </p:cSld>
+  <p:clrMapOvr>
+    <a:masterClrMapping/>
+  </p:clrMapOvr>
+</p:sld>
+</file>
+
+<file path=ppt/slides/slide10.xml><?xml version="1.0" encoding="utf-8"?>
+<p:sld xmlns:a="http://schemas.openxmlformats.org/drawingml/2006/main" xmlns:r="http://schemas.openxmlformats.org/officeDocument/2006/relationships" xmlns:p="http://schemas.openxmlformats.org/presentationml/2006/main">
+  <p:cSld>
+    <p:spTree>
+      <p:nvGrpSpPr>
+        <p:cNvPr id="1" name="">
+          <a:extLst>
+            <a:ext uri="{FF2B5EF4-FFF2-40B4-BE49-F238E27FC236}">
+              <a16:creationId xmlns:a16="http://schemas.microsoft.com/office/drawing/2014/main" id="{8091240C-6A6F-153D-6F6E-1E9CE4BC53D1}"/>
+            </a:ext>
+          </a:extLst>
+        </p:cNvPr>
+        <p:cNvGrpSpPr/>
+        <p:nvPr/>
+      </p:nvGrpSpPr>
+      <p:grpSpPr>
+        <a:xfrm>
+          <a:off x="0" y="0"/>
+          <a:ext cx="0" cy="0"/>
+          <a:chOff x="0" y="0"/>
+          <a:chExt cx="0" cy="0"/>
+        </a:xfrm>
+      </p:grpSpPr>
+      <p:pic>
+        <p:nvPicPr>
+          <p:cNvPr id="2" name="Picture 1">
+            <a:extLst>
+              <a:ext uri="{FF2B5EF4-FFF2-40B4-BE49-F238E27FC236}">
+                <a16:creationId xmlns:a16="http://schemas.microsoft.com/office/drawing/2014/main" id="{0C4D1C44-7A77-7E36-90D4-A640553C0719}"/>
+              </a:ext>
+            </a:extLst>
+          </p:cNvPr>
+          <p:cNvPicPr>
+            <a:picLocks noChangeAspect="1"/>
+          </p:cNvPicPr>
+          <p:nvPr/>
+        </p:nvPicPr>
+        <p:blipFill>
+          <a:blip r:embed="rId2"/>
+          <a:stretch>
+            <a:fillRect/>
+          </a:stretch>
+        </p:blipFill>
+        <p:spPr>
+          <a:xfrm>
+            <a:off x="-220150" y="362310"/>
+            <a:ext cx="12632299" cy="5814204"/>
+          </a:xfrm>
+          <a:prstGeom prst="rect">
+            <a:avLst/>
+          </a:prstGeom>
+        </p:spPr>
+      </p:pic>
+    </p:spTree>
+    <p:extLst>
+      <p:ext uri="{BB962C8B-B14F-4D97-AF65-F5344CB8AC3E}">
+        <p14:creationId xmlns:p14="http://schemas.microsoft.com/office/powerpoint/2010/main" val="4048823229"/>
       </p:ext>
     </p:extLst>
   </p:cSld>
@@ -3402,7 +4013,7 @@
         <p:cNvPr id="1" name="">
           <a:extLst>
             <a:ext uri="{FF2B5EF4-FFF2-40B4-BE49-F238E27FC236}">
-              <a16:creationId xmlns:a16="http://schemas.microsoft.com/office/drawing/2014/main" id="{D8E1A12B-7F4F-5D9D-BF77-E5910B2F4903}"/>
+              <a16:creationId xmlns:a16="http://schemas.microsoft.com/office/drawing/2014/main" id="{F8DB5873-1B83-FFF8-D815-5AC27F53A8D4}"/>
             </a:ext>
           </a:extLst>
         </p:cNvPr>
@@ -3419,10 +4030,10 @@
       </p:grpSpPr>
       <p:pic>
         <p:nvPicPr>
-          <p:cNvPr id="3" name="Picture 2" descr="A blue background with white text&#10;&#10;AI-generated content may be incorrect.">
-            <a:extLst>
-              <a:ext uri="{FF2B5EF4-FFF2-40B4-BE49-F238E27FC236}">
-                <a16:creationId xmlns:a16="http://schemas.microsoft.com/office/drawing/2014/main" id="{2CDE02F7-D020-37B1-EE41-2D5F2BCDC5BE}"/>
+          <p:cNvPr id="3" name="Picture 2" descr="A screenshot of a computer&#10;&#10;AI-generated content may be incorrect.">
+            <a:extLst>
+              <a:ext uri="{FF2B5EF4-FFF2-40B4-BE49-F238E27FC236}">
+                <a16:creationId xmlns:a16="http://schemas.microsoft.com/office/drawing/2014/main" id="{01C9045A-A04A-7D53-0F2E-1C1769C63A80}"/>
               </a:ext>
             </a:extLst>
           </p:cNvPr>
@@ -3439,8 +4050,8 @@
         </p:blipFill>
         <p:spPr>
           <a:xfrm>
-            <a:off x="-57687" y="-18535"/>
-            <a:ext cx="12307374" cy="6956854"/>
+            <a:off x="-135986" y="-1"/>
+            <a:ext cx="12327986" cy="6881073"/>
           </a:xfrm>
           <a:prstGeom prst="rect">
             <a:avLst/>
@@ -3450,7 +4061,7 @@
     </p:spTree>
     <p:extLst>
       <p:ext uri="{BB962C8B-B14F-4D97-AF65-F5344CB8AC3E}">
-        <p14:creationId xmlns:p14="http://schemas.microsoft.com/office/powerpoint/2010/main" val="2802915278"/>
+        <p14:creationId xmlns:p14="http://schemas.microsoft.com/office/powerpoint/2010/main" val="2868202449"/>
       </p:ext>
     </p:extLst>
   </p:cSld>
@@ -3468,7 +4079,7 @@
         <p:cNvPr id="1" name="">
           <a:extLst>
             <a:ext uri="{FF2B5EF4-FFF2-40B4-BE49-F238E27FC236}">
-              <a16:creationId xmlns:a16="http://schemas.microsoft.com/office/drawing/2014/main" id="{F609BD43-2487-CFD7-F058-1D58D7A11261}"/>
+              <a16:creationId xmlns:a16="http://schemas.microsoft.com/office/drawing/2014/main" id="{60F756ED-FBDE-C837-BFB9-D2C8DA6D4462}"/>
             </a:ext>
           </a:extLst>
         </p:cNvPr>
@@ -3485,10 +4096,10 @@
       </p:grpSpPr>
       <p:pic>
         <p:nvPicPr>
-          <p:cNvPr id="3" name="Picture 2" descr="A blue background with white text&#10;&#10;AI-generated content may be incorrect.">
-            <a:extLst>
-              <a:ext uri="{FF2B5EF4-FFF2-40B4-BE49-F238E27FC236}">
-                <a16:creationId xmlns:a16="http://schemas.microsoft.com/office/drawing/2014/main" id="{4066990E-D1C5-595C-7F3C-78E39BA0B165}"/>
+          <p:cNvPr id="2" name="Picture 1">
+            <a:extLst>
+              <a:ext uri="{FF2B5EF4-FFF2-40B4-BE49-F238E27FC236}">
+                <a16:creationId xmlns:a16="http://schemas.microsoft.com/office/drawing/2014/main" id="{6025CAED-D346-13FE-7777-557D4EE34C53}"/>
               </a:ext>
             </a:extLst>
           </p:cNvPr>
@@ -3505,8 +4116,8 @@
         </p:blipFill>
         <p:spPr>
           <a:xfrm>
-            <a:off x="-135925" y="-168255"/>
-            <a:ext cx="12772385" cy="7174536"/>
+            <a:off x="-132026" y="320270"/>
+            <a:ext cx="12490557" cy="6217459"/>
           </a:xfrm>
           <a:prstGeom prst="rect">
             <a:avLst/>
@@ -3516,7 +4127,7 @@
     </p:spTree>
     <p:extLst>
       <p:ext uri="{BB962C8B-B14F-4D97-AF65-F5344CB8AC3E}">
-        <p14:creationId xmlns:p14="http://schemas.microsoft.com/office/powerpoint/2010/main" val="640123481"/>
+        <p14:creationId xmlns:p14="http://schemas.microsoft.com/office/powerpoint/2010/main" val="3109208345"/>
       </p:ext>
     </p:extLst>
   </p:cSld>
@@ -3534,7 +4145,7 @@
         <p:cNvPr id="1" name="">
           <a:extLst>
             <a:ext uri="{FF2B5EF4-FFF2-40B4-BE49-F238E27FC236}">
-              <a16:creationId xmlns:a16="http://schemas.microsoft.com/office/drawing/2014/main" id="{41E90039-4C56-BD28-93FA-93D582ABC6C4}"/>
+              <a16:creationId xmlns:a16="http://schemas.microsoft.com/office/drawing/2014/main" id="{43D5437A-A6A4-DA70-0FB3-5A3439AF18AB}"/>
             </a:ext>
           </a:extLst>
         </p:cNvPr>
@@ -3551,10 +4162,10 @@
       </p:grpSpPr>
       <p:pic>
         <p:nvPicPr>
-          <p:cNvPr id="3" name="Picture 2" descr="A blue background with white text&#10;&#10;AI-generated content may be incorrect.">
-            <a:extLst>
-              <a:ext uri="{FF2B5EF4-FFF2-40B4-BE49-F238E27FC236}">
-                <a16:creationId xmlns:a16="http://schemas.microsoft.com/office/drawing/2014/main" id="{662755A5-8D43-EDA7-C195-57C04E148BAD}"/>
+          <p:cNvPr id="3" name="Picture 2" descr="A screenshot of a graph&#10;&#10;AI-generated content may be incorrect.">
+            <a:extLst>
+              <a:ext uri="{FF2B5EF4-FFF2-40B4-BE49-F238E27FC236}">
+                <a16:creationId xmlns:a16="http://schemas.microsoft.com/office/drawing/2014/main" id="{CEA60B70-0A13-4F2C-E9C2-246FCCA5E21A}"/>
               </a:ext>
             </a:extLst>
           </p:cNvPr>
@@ -3571,8 +4182,8 @@
         </p:blipFill>
         <p:spPr>
           <a:xfrm>
-            <a:off x="-99634" y="-135925"/>
-            <a:ext cx="12844338" cy="7253417"/>
+            <a:off x="-1" y="-1"/>
+            <a:ext cx="12439291" cy="6959555"/>
           </a:xfrm>
           <a:prstGeom prst="rect">
             <a:avLst/>
@@ -3582,7 +4193,7 @@
     </p:spTree>
     <p:extLst>
       <p:ext uri="{BB962C8B-B14F-4D97-AF65-F5344CB8AC3E}">
-        <p14:creationId xmlns:p14="http://schemas.microsoft.com/office/powerpoint/2010/main" val="2659328265"/>
+        <p14:creationId xmlns:p14="http://schemas.microsoft.com/office/powerpoint/2010/main" val="1216418517"/>
       </p:ext>
     </p:extLst>
   </p:cSld>
@@ -3600,7 +4211,7 @@
         <p:cNvPr id="1" name="">
           <a:extLst>
             <a:ext uri="{FF2B5EF4-FFF2-40B4-BE49-F238E27FC236}">
-              <a16:creationId xmlns:a16="http://schemas.microsoft.com/office/drawing/2014/main" id="{8630771F-9242-B1D7-C002-7F9899A54037}"/>
+              <a16:creationId xmlns:a16="http://schemas.microsoft.com/office/drawing/2014/main" id="{D920D8C0-1E77-C101-36B8-5CFDC3B24036}"/>
             </a:ext>
           </a:extLst>
         </p:cNvPr>
@@ -3617,10 +4228,10 @@
       </p:grpSpPr>
       <p:pic>
         <p:nvPicPr>
-          <p:cNvPr id="5" name="Picture 4">
-            <a:extLst>
-              <a:ext uri="{FF2B5EF4-FFF2-40B4-BE49-F238E27FC236}">
-                <a16:creationId xmlns:a16="http://schemas.microsoft.com/office/drawing/2014/main" id="{A0E378C2-14B0-8409-9ECE-3C6E12CE702F}"/>
+          <p:cNvPr id="3" name="Picture 2" descr="A screenshot of a computer&#10;&#10;AI-generated content may be incorrect.">
+            <a:extLst>
+              <a:ext uri="{FF2B5EF4-FFF2-40B4-BE49-F238E27FC236}">
+                <a16:creationId xmlns:a16="http://schemas.microsoft.com/office/drawing/2014/main" id="{BB7C182E-891A-777D-E1CB-553F72737020}"/>
               </a:ext>
             </a:extLst>
           </p:cNvPr>
@@ -3637,8 +4248,8 @@
         </p:blipFill>
         <p:spPr>
           <a:xfrm>
-            <a:off x="-41970" y="-112478"/>
-            <a:ext cx="12477276" cy="6970478"/>
+            <a:off x="-1" y="0"/>
+            <a:ext cx="12219495" cy="6331789"/>
           </a:xfrm>
           <a:prstGeom prst="rect">
             <a:avLst/>
@@ -3648,7 +4259,271 @@
     </p:spTree>
     <p:extLst>
       <p:ext uri="{BB962C8B-B14F-4D97-AF65-F5344CB8AC3E}">
-        <p14:creationId xmlns:p14="http://schemas.microsoft.com/office/powerpoint/2010/main" val="1934949091"/>
+        <p14:creationId xmlns:p14="http://schemas.microsoft.com/office/powerpoint/2010/main" val="4213570173"/>
+      </p:ext>
+    </p:extLst>
+  </p:cSld>
+  <p:clrMapOvr>
+    <a:masterClrMapping/>
+  </p:clrMapOvr>
+</p:sld>
+</file>
+
+<file path=ppt/slides/slide6.xml><?xml version="1.0" encoding="utf-8"?>
+<p:sld xmlns:a="http://schemas.openxmlformats.org/drawingml/2006/main" xmlns:r="http://schemas.openxmlformats.org/officeDocument/2006/relationships" xmlns:p="http://schemas.openxmlformats.org/presentationml/2006/main">
+  <p:cSld>
+    <p:spTree>
+      <p:nvGrpSpPr>
+        <p:cNvPr id="1" name="">
+          <a:extLst>
+            <a:ext uri="{FF2B5EF4-FFF2-40B4-BE49-F238E27FC236}">
+              <a16:creationId xmlns:a16="http://schemas.microsoft.com/office/drawing/2014/main" id="{5CF37B18-48A3-8412-5AC3-96DED72E9C67}"/>
+            </a:ext>
+          </a:extLst>
+        </p:cNvPr>
+        <p:cNvGrpSpPr/>
+        <p:nvPr/>
+      </p:nvGrpSpPr>
+      <p:grpSpPr>
+        <a:xfrm>
+          <a:off x="0" y="0"/>
+          <a:ext cx="0" cy="0"/>
+          <a:chOff x="0" y="0"/>
+          <a:chExt cx="0" cy="0"/>
+        </a:xfrm>
+      </p:grpSpPr>
+      <p:pic>
+        <p:nvPicPr>
+          <p:cNvPr id="2" name="Picture 1">
+            <a:extLst>
+              <a:ext uri="{FF2B5EF4-FFF2-40B4-BE49-F238E27FC236}">
+                <a16:creationId xmlns:a16="http://schemas.microsoft.com/office/drawing/2014/main" id="{2E78AC96-B462-15AA-EAD8-AAFF2B4B96B2}"/>
+              </a:ext>
+            </a:extLst>
+          </p:cNvPr>
+          <p:cNvPicPr>
+            <a:picLocks noChangeAspect="1"/>
+          </p:cNvPicPr>
+          <p:nvPr/>
+        </p:nvPicPr>
+        <p:blipFill>
+          <a:blip r:embed="rId2"/>
+          <a:stretch>
+            <a:fillRect/>
+          </a:stretch>
+        </p:blipFill>
+        <p:spPr>
+          <a:xfrm>
+            <a:off x="-284868" y="86265"/>
+            <a:ext cx="12761736" cy="6679305"/>
+          </a:xfrm>
+          <a:prstGeom prst="rect">
+            <a:avLst/>
+          </a:prstGeom>
+        </p:spPr>
+      </p:pic>
+    </p:spTree>
+    <p:extLst>
+      <p:ext uri="{BB962C8B-B14F-4D97-AF65-F5344CB8AC3E}">
+        <p14:creationId xmlns:p14="http://schemas.microsoft.com/office/powerpoint/2010/main" val="1043998276"/>
+      </p:ext>
+    </p:extLst>
+  </p:cSld>
+  <p:clrMapOvr>
+    <a:masterClrMapping/>
+  </p:clrMapOvr>
+</p:sld>
+</file>
+
+<file path=ppt/slides/slide7.xml><?xml version="1.0" encoding="utf-8"?>
+<p:sld xmlns:a="http://schemas.openxmlformats.org/drawingml/2006/main" xmlns:r="http://schemas.openxmlformats.org/officeDocument/2006/relationships" xmlns:p="http://schemas.openxmlformats.org/presentationml/2006/main">
+  <p:cSld>
+    <p:spTree>
+      <p:nvGrpSpPr>
+        <p:cNvPr id="1" name="">
+          <a:extLst>
+            <a:ext uri="{FF2B5EF4-FFF2-40B4-BE49-F238E27FC236}">
+              <a16:creationId xmlns:a16="http://schemas.microsoft.com/office/drawing/2014/main" id="{4F01C62A-D7DE-1D60-8E18-B15D572D4C56}"/>
+            </a:ext>
+          </a:extLst>
+        </p:cNvPr>
+        <p:cNvGrpSpPr/>
+        <p:nvPr/>
+      </p:nvGrpSpPr>
+      <p:grpSpPr>
+        <a:xfrm>
+          <a:off x="0" y="0"/>
+          <a:ext cx="0" cy="0"/>
+          <a:chOff x="0" y="0"/>
+          <a:chExt cx="0" cy="0"/>
+        </a:xfrm>
+      </p:grpSpPr>
+      <p:pic>
+        <p:nvPicPr>
+          <p:cNvPr id="3" name="Picture 2" descr="A graph on a white background&#10;&#10;AI-generated content may be incorrect.">
+            <a:extLst>
+              <a:ext uri="{FF2B5EF4-FFF2-40B4-BE49-F238E27FC236}">
+                <a16:creationId xmlns:a16="http://schemas.microsoft.com/office/drawing/2014/main" id="{4A110FBF-20AC-2F1C-DA9C-D252F7A87749}"/>
+              </a:ext>
+            </a:extLst>
+          </p:cNvPr>
+          <p:cNvPicPr>
+            <a:picLocks noChangeAspect="1"/>
+          </p:cNvPicPr>
+          <p:nvPr/>
+        </p:nvPicPr>
+        <p:blipFill>
+          <a:blip r:embed="rId3"/>
+          <a:stretch>
+            <a:fillRect/>
+          </a:stretch>
+        </p:blipFill>
+        <p:spPr>
+          <a:xfrm>
+            <a:off x="-46009" y="0"/>
+            <a:ext cx="12071231" cy="6637054"/>
+          </a:xfrm>
+          <a:prstGeom prst="rect">
+            <a:avLst/>
+          </a:prstGeom>
+        </p:spPr>
+      </p:pic>
+    </p:spTree>
+    <p:extLst>
+      <p:ext uri="{BB962C8B-B14F-4D97-AF65-F5344CB8AC3E}">
+        <p14:creationId xmlns:p14="http://schemas.microsoft.com/office/powerpoint/2010/main" val="2548857044"/>
+      </p:ext>
+    </p:extLst>
+  </p:cSld>
+  <p:clrMapOvr>
+    <a:masterClrMapping/>
+  </p:clrMapOvr>
+</p:sld>
+</file>
+
+<file path=ppt/slides/slide8.xml><?xml version="1.0" encoding="utf-8"?>
+<p:sld xmlns:a="http://schemas.openxmlformats.org/drawingml/2006/main" xmlns:r="http://schemas.openxmlformats.org/officeDocument/2006/relationships" xmlns:p="http://schemas.openxmlformats.org/presentationml/2006/main">
+  <p:cSld>
+    <p:spTree>
+      <p:nvGrpSpPr>
+        <p:cNvPr id="1" name="">
+          <a:extLst>
+            <a:ext uri="{FF2B5EF4-FFF2-40B4-BE49-F238E27FC236}">
+              <a16:creationId xmlns:a16="http://schemas.microsoft.com/office/drawing/2014/main" id="{BAE1CBCD-26AE-D9CF-DD3C-EB9E9F7975F0}"/>
+            </a:ext>
+          </a:extLst>
+        </p:cNvPr>
+        <p:cNvGrpSpPr/>
+        <p:nvPr/>
+      </p:nvGrpSpPr>
+      <p:grpSpPr>
+        <a:xfrm>
+          <a:off x="0" y="0"/>
+          <a:ext cx="0" cy="0"/>
+          <a:chOff x="0" y="0"/>
+          <a:chExt cx="0" cy="0"/>
+        </a:xfrm>
+      </p:grpSpPr>
+      <p:pic>
+        <p:nvPicPr>
+          <p:cNvPr id="2" name="Picture 1">
+            <a:extLst>
+              <a:ext uri="{FF2B5EF4-FFF2-40B4-BE49-F238E27FC236}">
+                <a16:creationId xmlns:a16="http://schemas.microsoft.com/office/drawing/2014/main" id="{37ACD948-B54C-9392-6071-70A6EA34E2CA}"/>
+              </a:ext>
+            </a:extLst>
+          </p:cNvPr>
+          <p:cNvPicPr>
+            <a:picLocks noChangeAspect="1"/>
+          </p:cNvPicPr>
+          <p:nvPr/>
+        </p:nvPicPr>
+        <p:blipFill>
+          <a:blip r:embed="rId3"/>
+          <a:stretch>
+            <a:fillRect/>
+          </a:stretch>
+        </p:blipFill>
+        <p:spPr>
+          <a:xfrm>
+            <a:off x="-427101" y="-128556"/>
+            <a:ext cx="13775688" cy="7167711"/>
+          </a:xfrm>
+          <a:prstGeom prst="rect">
+            <a:avLst/>
+          </a:prstGeom>
+        </p:spPr>
+      </p:pic>
+    </p:spTree>
+    <p:extLst>
+      <p:ext uri="{BB962C8B-B14F-4D97-AF65-F5344CB8AC3E}">
+        <p14:creationId xmlns:p14="http://schemas.microsoft.com/office/powerpoint/2010/main" val="2140804417"/>
+      </p:ext>
+    </p:extLst>
+  </p:cSld>
+  <p:clrMapOvr>
+    <a:masterClrMapping/>
+  </p:clrMapOvr>
+</p:sld>
+</file>
+
+<file path=ppt/slides/slide9.xml><?xml version="1.0" encoding="utf-8"?>
+<p:sld xmlns:a="http://schemas.openxmlformats.org/drawingml/2006/main" xmlns:r="http://schemas.openxmlformats.org/officeDocument/2006/relationships" xmlns:p="http://schemas.openxmlformats.org/presentationml/2006/main">
+  <p:cSld>
+    <p:spTree>
+      <p:nvGrpSpPr>
+        <p:cNvPr id="1" name="">
+          <a:extLst>
+            <a:ext uri="{FF2B5EF4-FFF2-40B4-BE49-F238E27FC236}">
+              <a16:creationId xmlns:a16="http://schemas.microsoft.com/office/drawing/2014/main" id="{70071651-146D-19FD-5429-EDA175443A7E}"/>
+            </a:ext>
+          </a:extLst>
+        </p:cNvPr>
+        <p:cNvGrpSpPr/>
+        <p:nvPr/>
+      </p:nvGrpSpPr>
+      <p:grpSpPr>
+        <a:xfrm>
+          <a:off x="0" y="0"/>
+          <a:ext cx="0" cy="0"/>
+          <a:chOff x="0" y="0"/>
+          <a:chExt cx="0" cy="0"/>
+        </a:xfrm>
+      </p:grpSpPr>
+      <p:pic>
+        <p:nvPicPr>
+          <p:cNvPr id="5" name="Picture 4" descr="A screenshot of a graph&#10;&#10;AI-generated content may be incorrect.">
+            <a:extLst>
+              <a:ext uri="{FF2B5EF4-FFF2-40B4-BE49-F238E27FC236}">
+                <a16:creationId xmlns:a16="http://schemas.microsoft.com/office/drawing/2014/main" id="{21346EC5-5547-A332-67C0-27202CFB5C96}"/>
+              </a:ext>
+            </a:extLst>
+          </p:cNvPr>
+          <p:cNvPicPr>
+            <a:picLocks noChangeAspect="1"/>
+          </p:cNvPicPr>
+          <p:nvPr/>
+        </p:nvPicPr>
+        <p:blipFill>
+          <a:blip r:embed="rId2"/>
+          <a:stretch>
+            <a:fillRect/>
+          </a:stretch>
+        </p:blipFill>
+        <p:spPr>
+          <a:xfrm>
+            <a:off x="-1" y="0"/>
+            <a:ext cx="12124075" cy="6694098"/>
+          </a:xfrm>
+          <a:prstGeom prst="rect">
+            <a:avLst/>
+          </a:prstGeom>
+        </p:spPr>
+      </p:pic>
+    </p:spTree>
+    <p:extLst>
+      <p:ext uri="{BB962C8B-B14F-4D97-AF65-F5344CB8AC3E}">
+        <p14:creationId xmlns:p14="http://schemas.microsoft.com/office/powerpoint/2010/main" val="2988792721"/>
       </p:ext>
     </p:extLst>
   </p:cSld>
@@ -3971,4 +4846,319 @@
     </a:ext>
   </a:extLst>
 </a:theme>
+</file>
+
+<file path=ppt/theme/theme2.xml><?xml version="1.0" encoding="utf-8"?>
+<a:theme xmlns:a="http://schemas.openxmlformats.org/drawingml/2006/main" name="Office Theme">
+  <a:themeElements>
+    <a:clrScheme name="Office">
+      <a:dk1>
+        <a:sysClr val="windowText" lastClr="000000"/>
+      </a:dk1>
+      <a:lt1>
+        <a:sysClr val="window" lastClr="FFFFFF"/>
+      </a:lt1>
+      <a:dk2>
+        <a:srgbClr val="0E2841"/>
+      </a:dk2>
+      <a:lt2>
+        <a:srgbClr val="E8E8E8"/>
+      </a:lt2>
+      <a:accent1>
+        <a:srgbClr val="156082"/>
+      </a:accent1>
+      <a:accent2>
+        <a:srgbClr val="E97132"/>
+      </a:accent2>
+      <a:accent3>
+        <a:srgbClr val="196B24"/>
+      </a:accent3>
+      <a:accent4>
+        <a:srgbClr val="0F9ED5"/>
+      </a:accent4>
+      <a:accent5>
+        <a:srgbClr val="A02B93"/>
+      </a:accent5>
+      <a:accent6>
+        <a:srgbClr val="4EA72E"/>
+      </a:accent6>
+      <a:hlink>
+        <a:srgbClr val="467886"/>
+      </a:hlink>
+      <a:folHlink>
+        <a:srgbClr val="96607D"/>
+      </a:folHlink>
+    </a:clrScheme>
+    <a:fontScheme name="Office">
+      <a:majorFont>
+        <a:latin typeface="Aptos Display" panose="02110004020202020204"/>
+        <a:ea typeface=""/>
+        <a:cs typeface=""/>
+        <a:font script="Jpan" typeface="游ゴシック Light"/>
+        <a:font script="Hang" typeface="맑은 고딕"/>
+        <a:font script="Hans" typeface="等线 Light"/>
+        <a:font script="Hant" typeface="新細明體"/>
+        <a:font script="Arab" typeface="Times New Roman"/>
+        <a:font script="Hebr" typeface="Times New Roman"/>
+        <a:font script="Thai" typeface="Angsana New"/>
+        <a:font script="Ethi" typeface="Nyala"/>
+        <a:font script="Beng" typeface="Vrinda"/>
+        <a:font script="Gujr" typeface="Shruti"/>
+        <a:font script="Khmr" typeface="MoolBoran"/>
+        <a:font script="Knda" typeface="Tunga"/>
+        <a:font script="Guru" typeface="Raavi"/>
+        <a:font script="Cans" typeface="Euphemia"/>
+        <a:font script="Cher" typeface="Plantagenet Cherokee"/>
+        <a:font script="Yiii" typeface="Microsoft Yi Baiti"/>
+        <a:font script="Tibt" typeface="Microsoft Himalaya"/>
+        <a:font script="Thaa" typeface="MV Boli"/>
+        <a:font script="Deva" typeface="Mangal"/>
+        <a:font script="Telu" typeface="Gautami"/>
+        <a:font script="Taml" typeface="Latha"/>
+        <a:font script="Syrc" typeface="Estrangelo Edessa"/>
+        <a:font script="Orya" typeface="Kalinga"/>
+        <a:font script="Mlym" typeface="Kartika"/>
+        <a:font script="Laoo" typeface="DokChampa"/>
+        <a:font script="Sinh" typeface="Iskoola Pota"/>
+        <a:font script="Mong" typeface="Mongolian Baiti"/>
+        <a:font script="Viet" typeface="Times New Roman"/>
+        <a:font script="Uigh" typeface="Microsoft Uighur"/>
+        <a:font script="Geor" typeface="Sylfaen"/>
+        <a:font script="Armn" typeface="Arial"/>
+        <a:font script="Bugi" typeface="Leelawadee UI"/>
+        <a:font script="Bopo" typeface="Microsoft JhengHei"/>
+        <a:font script="Java" typeface="Javanese Text"/>
+        <a:font script="Lisu" typeface="Segoe UI"/>
+        <a:font script="Mymr" typeface="Myanmar Text"/>
+        <a:font script="Nkoo" typeface="Ebrima"/>
+        <a:font script="Olck" typeface="Nirmala UI"/>
+        <a:font script="Osma" typeface="Ebrima"/>
+        <a:font script="Phag" typeface="Phagspa"/>
+        <a:font script="Syrn" typeface="Estrangelo Edessa"/>
+        <a:font script="Syrj" typeface="Estrangelo Edessa"/>
+        <a:font script="Syre" typeface="Estrangelo Edessa"/>
+        <a:font script="Sora" typeface="Nirmala UI"/>
+        <a:font script="Tale" typeface="Microsoft Tai Le"/>
+        <a:font script="Talu" typeface="Microsoft New Tai Lue"/>
+        <a:font script="Tfng" typeface="Ebrima"/>
+      </a:majorFont>
+      <a:minorFont>
+        <a:latin typeface="Aptos" panose="02110004020202020204"/>
+        <a:ea typeface=""/>
+        <a:cs typeface=""/>
+        <a:font script="Jpan" typeface="游ゴシック"/>
+        <a:font script="Hang" typeface="맑은 고딕"/>
+        <a:font script="Hans" typeface="等线"/>
+        <a:font script="Hant" typeface="新細明體"/>
+        <a:font script="Arab" typeface="Arial"/>
+        <a:font script="Hebr" typeface="Arial"/>
+        <a:font script="Thai" typeface="Cordia New"/>
+        <a:font script="Ethi" typeface="Nyala"/>
+        <a:font script="Beng" typeface="Vrinda"/>
+        <a:font script="Gujr" typeface="Shruti"/>
+        <a:font script="Khmr" typeface="DaunPenh"/>
+        <a:font script="Knda" typeface="Tunga"/>
+        <a:font script="Guru" typeface="Raavi"/>
+        <a:font script="Cans" typeface="Euphemia"/>
+        <a:font script="Cher" typeface="Plantagenet Cherokee"/>
+        <a:font script="Yiii" typeface="Microsoft Yi Baiti"/>
+        <a:font script="Tibt" typeface="Microsoft Himalaya"/>
+        <a:font script="Thaa" typeface="MV Boli"/>
+        <a:font script="Deva" typeface="Mangal"/>
+        <a:font script="Telu" typeface="Gautami"/>
+        <a:font script="Taml" typeface="Latha"/>
+        <a:font script="Syrc" typeface="Estrangelo Edessa"/>
+        <a:font script="Orya" typeface="Kalinga"/>
+        <a:font script="Mlym" typeface="Kartika"/>
+        <a:font script="Laoo" typeface="DokChampa"/>
+        <a:font script="Sinh" typeface="Iskoola Pota"/>
+        <a:font script="Mong" typeface="Mongolian Baiti"/>
+        <a:font script="Viet" typeface="Arial"/>
+        <a:font script="Uigh" typeface="Microsoft Uighur"/>
+        <a:font script="Geor" typeface="Sylfaen"/>
+        <a:font script="Armn" typeface="Arial"/>
+        <a:font script="Bugi" typeface="Leelawadee UI"/>
+        <a:font script="Bopo" typeface="Microsoft JhengHei"/>
+        <a:font script="Java" typeface="Javanese Text"/>
+        <a:font script="Lisu" typeface="Segoe UI"/>
+        <a:font script="Mymr" typeface="Myanmar Text"/>
+        <a:font script="Nkoo" typeface="Ebrima"/>
+        <a:font script="Olck" typeface="Nirmala UI"/>
+        <a:font script="Osma" typeface="Ebrima"/>
+        <a:font script="Phag" typeface="Phagspa"/>
+        <a:font script="Syrn" typeface="Estrangelo Edessa"/>
+        <a:font script="Syrj" typeface="Estrangelo Edessa"/>
+        <a:font script="Syre" typeface="Estrangelo Edessa"/>
+        <a:font script="Sora" typeface="Nirmala UI"/>
+        <a:font script="Tale" typeface="Microsoft Tai Le"/>
+        <a:font script="Talu" typeface="Microsoft New Tai Lue"/>
+        <a:font script="Tfng" typeface="Ebrima"/>
+      </a:minorFont>
+    </a:fontScheme>
+    <a:fmtScheme name="Office">
+      <a:fillStyleLst>
+        <a:solidFill>
+          <a:schemeClr val="phClr"/>
+        </a:solidFill>
+        <a:gradFill rotWithShape="1">
+          <a:gsLst>
+            <a:gs pos="0">
+              <a:schemeClr val="phClr">
+                <a:lumMod val="110000"/>
+                <a:satMod val="105000"/>
+                <a:tint val="67000"/>
+              </a:schemeClr>
+            </a:gs>
+            <a:gs pos="50000">
+              <a:schemeClr val="phClr">
+                <a:lumMod val="105000"/>
+                <a:satMod val="103000"/>
+                <a:tint val="73000"/>
+              </a:schemeClr>
+            </a:gs>
+            <a:gs pos="100000">
+              <a:schemeClr val="phClr">
+                <a:lumMod val="105000"/>
+                <a:satMod val="109000"/>
+                <a:tint val="81000"/>
+              </a:schemeClr>
+            </a:gs>
+          </a:gsLst>
+          <a:lin ang="5400000" scaled="0"/>
+        </a:gradFill>
+        <a:gradFill rotWithShape="1">
+          <a:gsLst>
+            <a:gs pos="0">
+              <a:schemeClr val="phClr">
+                <a:satMod val="103000"/>
+                <a:lumMod val="102000"/>
+                <a:tint val="94000"/>
+              </a:schemeClr>
+            </a:gs>
+            <a:gs pos="50000">
+              <a:schemeClr val="phClr">
+                <a:satMod val="110000"/>
+                <a:lumMod val="100000"/>
+                <a:shade val="100000"/>
+              </a:schemeClr>
+            </a:gs>
+            <a:gs pos="100000">
+              <a:schemeClr val="phClr">
+                <a:lumMod val="99000"/>
+                <a:satMod val="120000"/>
+                <a:shade val="78000"/>
+              </a:schemeClr>
+            </a:gs>
+          </a:gsLst>
+          <a:lin ang="5400000" scaled="0"/>
+        </a:gradFill>
+      </a:fillStyleLst>
+      <a:lnStyleLst>
+        <a:ln w="12700" cap="flat" cmpd="sng" algn="ctr">
+          <a:solidFill>
+            <a:schemeClr val="phClr"/>
+          </a:solidFill>
+          <a:prstDash val="solid"/>
+          <a:miter lim="800000"/>
+        </a:ln>
+        <a:ln w="19050" cap="flat" cmpd="sng" algn="ctr">
+          <a:solidFill>
+            <a:schemeClr val="phClr"/>
+          </a:solidFill>
+          <a:prstDash val="solid"/>
+          <a:miter lim="800000"/>
+        </a:ln>
+        <a:ln w="25400" cap="flat" cmpd="sng" algn="ctr">
+          <a:solidFill>
+            <a:schemeClr val="phClr"/>
+          </a:solidFill>
+          <a:prstDash val="solid"/>
+          <a:miter lim="800000"/>
+        </a:ln>
+      </a:lnStyleLst>
+      <a:effectStyleLst>
+        <a:effectStyle>
+          <a:effectLst/>
+        </a:effectStyle>
+        <a:effectStyle>
+          <a:effectLst/>
+        </a:effectStyle>
+        <a:effectStyle>
+          <a:effectLst>
+            <a:outerShdw blurRad="57150" dist="19050" dir="5400000" algn="ctr" rotWithShape="0">
+              <a:srgbClr val="000000">
+                <a:alpha val="63000"/>
+              </a:srgbClr>
+            </a:outerShdw>
+          </a:effectLst>
+        </a:effectStyle>
+      </a:effectStyleLst>
+      <a:bgFillStyleLst>
+        <a:solidFill>
+          <a:schemeClr val="phClr"/>
+        </a:solidFill>
+        <a:solidFill>
+          <a:schemeClr val="phClr">
+            <a:tint val="95000"/>
+            <a:satMod val="170000"/>
+          </a:schemeClr>
+        </a:solidFill>
+        <a:gradFill rotWithShape="1">
+          <a:gsLst>
+            <a:gs pos="0">
+              <a:schemeClr val="phClr">
+                <a:tint val="93000"/>
+                <a:satMod val="150000"/>
+                <a:shade val="98000"/>
+                <a:lumMod val="102000"/>
+              </a:schemeClr>
+            </a:gs>
+            <a:gs pos="50000">
+              <a:schemeClr val="phClr">
+                <a:tint val="98000"/>
+                <a:satMod val="130000"/>
+                <a:shade val="90000"/>
+                <a:lumMod val="103000"/>
+              </a:schemeClr>
+            </a:gs>
+            <a:gs pos="100000">
+              <a:schemeClr val="phClr">
+                <a:shade val="63000"/>
+                <a:satMod val="120000"/>
+              </a:schemeClr>
+            </a:gs>
+          </a:gsLst>
+          <a:lin ang="5400000" scaled="0"/>
+        </a:gradFill>
+      </a:bgFillStyleLst>
+    </a:fmtScheme>
+  </a:themeElements>
+  <a:objectDefaults>
+    <a:lnDef>
+      <a:spPr/>
+      <a:bodyPr/>
+      <a:lstStyle/>
+      <a:style>
+        <a:lnRef idx="2">
+          <a:schemeClr val="accent1"/>
+        </a:lnRef>
+        <a:fillRef idx="0">
+          <a:schemeClr val="accent1"/>
+        </a:fillRef>
+        <a:effectRef idx="1">
+          <a:schemeClr val="accent1"/>
+        </a:effectRef>
+        <a:fontRef idx="minor">
+          <a:schemeClr val="tx1"/>
+        </a:fontRef>
+      </a:style>
+    </a:lnDef>
+  </a:objectDefaults>
+  <a:extraClrSchemeLst/>
+  <a:extLst>
+    <a:ext uri="{05A4C25C-085E-4340-85A3-A5531E510DB2}">
+      <thm15:themeFamily xmlns:thm15="http://schemas.microsoft.com/office/thememl/2012/main" name="Office Theme" id="{2E142A2C-CD16-42D6-873A-C26D2A0506FA}" vid="{1BDDFF52-6CD6-40A5-AB3C-68EB2F1E4D0A}"/>
+    </a:ext>
+  </a:extLst>
+</a:theme>
 </file>
</xml_diff>